<commit_message>
added some tea images
</commit_message>
<xml_diff>
--- a/chadojs - who is testing the mocks - 16zu9.pptx
+++ b/chadojs - who is testing the mocks - 16zu9.pptx
@@ -237,7 +237,7 @@
             <a:fld id="{4DBE830D-4B1D-43AC-B523-377B51CEDACB}" type="datetimeFigureOut">
               <a:rPr lang="de-DE" smtClean="0"/>
               <a:pPr/>
-              <a:t>17.05.16</a:t>
+              <a:t>17.05.2016</a:t>
             </a:fld>
             <a:endParaRPr lang="de-DE"/>
           </a:p>
@@ -408,7 +408,7 @@
     </p:spTree>
     <p:extLst>
       <p:ext uri="{BB962C8B-B14F-4D97-AF65-F5344CB8AC3E}">
-        <p14:creationId xmlns:p14="http://schemas.microsoft.com/office/powerpoint/2010/main" val="20919523"/>
+        <p14:creationId xmlns:p14="http://schemas.microsoft.com/office/powerpoint/2010/main" xmlns="" val="20919523"/>
       </p:ext>
     </p:extLst>
   </p:cSld>
@@ -1150,7 +1150,7 @@
     </p:spTree>
     <p:extLst>
       <p:ext uri="{BB962C8B-B14F-4D97-AF65-F5344CB8AC3E}">
-        <p14:creationId xmlns:p14="http://schemas.microsoft.com/office/powerpoint/2010/main" val="2883834159"/>
+        <p14:creationId xmlns:p14="http://schemas.microsoft.com/office/powerpoint/2010/main" xmlns="" val="2883834159"/>
       </p:ext>
     </p:extLst>
   </p:cSld>
@@ -1410,7 +1410,7 @@
     </p:spTree>
     <p:extLst>
       <p:ext uri="{BB962C8B-B14F-4D97-AF65-F5344CB8AC3E}">
-        <p14:creationId xmlns:p14="http://schemas.microsoft.com/office/powerpoint/2010/main" val="2636513739"/>
+        <p14:creationId xmlns:p14="http://schemas.microsoft.com/office/powerpoint/2010/main" xmlns="" val="2636513739"/>
       </p:ext>
     </p:extLst>
   </p:cSld>
@@ -2150,7 +2150,7 @@
     </p:spTree>
     <p:extLst>
       <p:ext uri="{BB962C8B-B14F-4D97-AF65-F5344CB8AC3E}">
-        <p14:creationId xmlns:p14="http://schemas.microsoft.com/office/powerpoint/2010/main" val="2947478832"/>
+        <p14:creationId xmlns:p14="http://schemas.microsoft.com/office/powerpoint/2010/main" xmlns="" val="2947478832"/>
       </p:ext>
     </p:extLst>
   </p:cSld>
@@ -2291,7 +2291,7 @@
     </p:spTree>
     <p:extLst>
       <p:ext uri="{BB962C8B-B14F-4D97-AF65-F5344CB8AC3E}">
-        <p14:creationId xmlns:p14="http://schemas.microsoft.com/office/powerpoint/2010/main" val="2947478832"/>
+        <p14:creationId xmlns:p14="http://schemas.microsoft.com/office/powerpoint/2010/main" xmlns="" val="2947478832"/>
       </p:ext>
     </p:extLst>
   </p:cSld>
@@ -2483,7 +2483,7 @@
             <a:fld id="{1BA50D42-C9CD-4801-B293-61D1F53EC57E}" type="datetimeFigureOut">
               <a:rPr lang="de-DE" smtClean="0"/>
               <a:pPr/>
-              <a:t>17.05.16</a:t>
+              <a:t>17.05.2016</a:t>
             </a:fld>
             <a:endParaRPr lang="de-DE"/>
           </a:p>
@@ -2650,7 +2650,7 @@
             <a:fld id="{1BA50D42-C9CD-4801-B293-61D1F53EC57E}" type="datetimeFigureOut">
               <a:rPr lang="de-DE" smtClean="0"/>
               <a:pPr/>
-              <a:t>17.05.16</a:t>
+              <a:t>17.05.2016</a:t>
             </a:fld>
             <a:endParaRPr lang="de-DE"/>
           </a:p>
@@ -2827,7 +2827,7 @@
             <a:fld id="{1BA50D42-C9CD-4801-B293-61D1F53EC57E}" type="datetimeFigureOut">
               <a:rPr lang="de-DE" smtClean="0"/>
               <a:pPr/>
-              <a:t>17.05.16</a:t>
+              <a:t>17.05.2016</a:t>
             </a:fld>
             <a:endParaRPr lang="de-DE"/>
           </a:p>
@@ -2994,7 +2994,7 @@
             <a:fld id="{1BA50D42-C9CD-4801-B293-61D1F53EC57E}" type="datetimeFigureOut">
               <a:rPr lang="de-DE" smtClean="0"/>
               <a:pPr/>
-              <a:t>17.05.16</a:t>
+              <a:t>17.05.2016</a:t>
             </a:fld>
             <a:endParaRPr lang="de-DE"/>
           </a:p>
@@ -3237,7 +3237,7 @@
             <a:fld id="{1BA50D42-C9CD-4801-B293-61D1F53EC57E}" type="datetimeFigureOut">
               <a:rPr lang="de-DE" smtClean="0"/>
               <a:pPr/>
-              <a:t>17.05.16</a:t>
+              <a:t>17.05.2016</a:t>
             </a:fld>
             <a:endParaRPr lang="de-DE"/>
           </a:p>
@@ -3522,7 +3522,7 @@
             <a:fld id="{1BA50D42-C9CD-4801-B293-61D1F53EC57E}" type="datetimeFigureOut">
               <a:rPr lang="de-DE" smtClean="0"/>
               <a:pPr/>
-              <a:t>17.05.16</a:t>
+              <a:t>17.05.2016</a:t>
             </a:fld>
             <a:endParaRPr lang="de-DE"/>
           </a:p>
@@ -3941,7 +3941,7 @@
             <a:fld id="{1BA50D42-C9CD-4801-B293-61D1F53EC57E}" type="datetimeFigureOut">
               <a:rPr lang="de-DE" smtClean="0"/>
               <a:pPr/>
-              <a:t>17.05.16</a:t>
+              <a:t>17.05.2016</a:t>
             </a:fld>
             <a:endParaRPr lang="de-DE"/>
           </a:p>
@@ -4056,7 +4056,7 @@
             <a:fld id="{1BA50D42-C9CD-4801-B293-61D1F53EC57E}" type="datetimeFigureOut">
               <a:rPr lang="de-DE" smtClean="0"/>
               <a:pPr/>
-              <a:t>17.05.16</a:t>
+              <a:t>17.05.2016</a:t>
             </a:fld>
             <a:endParaRPr lang="de-DE"/>
           </a:p>
@@ -4148,7 +4148,7 @@
             <a:fld id="{1BA50D42-C9CD-4801-B293-61D1F53EC57E}" type="datetimeFigureOut">
               <a:rPr lang="de-DE" smtClean="0"/>
               <a:pPr/>
-              <a:t>17.05.16</a:t>
+              <a:t>17.05.2016</a:t>
             </a:fld>
             <a:endParaRPr lang="de-DE"/>
           </a:p>
@@ -4422,7 +4422,7 @@
             <a:fld id="{1BA50D42-C9CD-4801-B293-61D1F53EC57E}" type="datetimeFigureOut">
               <a:rPr lang="de-DE" smtClean="0"/>
               <a:pPr/>
-              <a:t>17.05.16</a:t>
+              <a:t>17.05.2016</a:t>
             </a:fld>
             <a:endParaRPr lang="de-DE"/>
           </a:p>
@@ -4672,7 +4672,7 @@
             <a:fld id="{1BA50D42-C9CD-4801-B293-61D1F53EC57E}" type="datetimeFigureOut">
               <a:rPr lang="de-DE" smtClean="0"/>
               <a:pPr/>
-              <a:t>17.05.16</a:t>
+              <a:t>17.05.2016</a:t>
             </a:fld>
             <a:endParaRPr lang="de-DE"/>
           </a:p>
@@ -4882,7 +4882,7 @@
             <a:fld id="{1BA50D42-C9CD-4801-B293-61D1F53EC57E}" type="datetimeFigureOut">
               <a:rPr lang="de-DE" smtClean="0"/>
               <a:pPr/>
-              <a:t>17.05.16</a:t>
+              <a:t>17.05.2016</a:t>
             </a:fld>
             <a:endParaRPr lang="de-DE"/>
           </a:p>
@@ -5529,7 +5529,7 @@
   <p:timing>
     <p:tnLst>
       <p:par>
-        <p:cTn xmlns:p14="http://schemas.microsoft.com/office/powerpoint/2010/main" id="1" dur="indefinite" restart="never" nodeType="tmRoot"/>
+        <p:cTn id="1" dur="indefinite" restart="never" nodeType="tmRoot"/>
       </p:par>
     </p:tnLst>
   </p:timing>
@@ -5754,7 +5754,7 @@
   <p:timing>
     <p:tnLst>
       <p:par>
-        <p:cTn xmlns:p14="http://schemas.microsoft.com/office/powerpoint/2010/main" id="1" dur="indefinite" restart="never" nodeType="tmRoot"/>
+        <p:cTn id="1" dur="indefinite" restart="never" nodeType="tmRoot"/>
       </p:par>
     </p:tnLst>
   </p:timing>
@@ -5971,7 +5971,7 @@
   <p:timing>
     <p:tnLst>
       <p:par>
-        <p:cTn xmlns:p14="http://schemas.microsoft.com/office/powerpoint/2010/main" id="1" dur="indefinite" restart="never" nodeType="tmRoot"/>
+        <p:cTn id="1" dur="indefinite" restart="never" nodeType="tmRoot"/>
       </p:par>
     </p:tnLst>
   </p:timing>
@@ -6166,6 +6166,110 @@
           </a:p>
         </p:txBody>
       </p:sp>
+      <p:pic>
+        <p:nvPicPr>
+          <p:cNvPr id="6" name="Picture 3" descr="C:\Users\Robin\Documents\GitHub\chado presentation\weitere teebilder\flowers-774816_1280.png"/>
+          <p:cNvPicPr>
+            <a:picLocks noChangeAspect="1" noChangeArrowheads="1"/>
+          </p:cNvPicPr>
+          <p:nvPr/>
+        </p:nvPicPr>
+        <p:blipFill>
+          <a:blip r:embed="rId3" cstate="print"/>
+          <a:srcRect/>
+          <a:stretch>
+            <a:fillRect/>
+          </a:stretch>
+        </p:blipFill>
+        <p:spPr bwMode="auto">
+          <a:xfrm>
+            <a:off x="2339752" y="2672580"/>
+            <a:ext cx="2119164" cy="2119164"/>
+          </a:xfrm>
+          <a:prstGeom prst="rect">
+            <a:avLst/>
+          </a:prstGeom>
+          <a:noFill/>
+        </p:spPr>
+      </p:pic>
+      <p:pic>
+        <p:nvPicPr>
+          <p:cNvPr id="7" name="Picture 4" descr="C:\Users\Robin\Documents\GitHub\chado presentation\weitere teebilder\dried-flower-782768_1280.png"/>
+          <p:cNvPicPr>
+            <a:picLocks noChangeAspect="1" noChangeArrowheads="1"/>
+          </p:cNvPicPr>
+          <p:nvPr/>
+        </p:nvPicPr>
+        <p:blipFill>
+          <a:blip r:embed="rId4" cstate="print"/>
+          <a:srcRect/>
+          <a:stretch>
+            <a:fillRect/>
+          </a:stretch>
+        </p:blipFill>
+        <p:spPr bwMode="auto">
+          <a:xfrm>
+            <a:off x="4572000" y="2672580"/>
+            <a:ext cx="2051720" cy="2051720"/>
+          </a:xfrm>
+          <a:prstGeom prst="rect">
+            <a:avLst/>
+          </a:prstGeom>
+          <a:noFill/>
+        </p:spPr>
+      </p:pic>
+      <p:pic>
+        <p:nvPicPr>
+          <p:cNvPr id="8" name="Picture 5" descr="C:\Users\Robin\Documents\GitHub\chado presentation\weitere teebilder\dried-774823_1280.png"/>
+          <p:cNvPicPr>
+            <a:picLocks noChangeAspect="1" noChangeArrowheads="1"/>
+          </p:cNvPicPr>
+          <p:nvPr/>
+        </p:nvPicPr>
+        <p:blipFill>
+          <a:blip r:embed="rId5" cstate="print"/>
+          <a:srcRect/>
+          <a:stretch>
+            <a:fillRect/>
+          </a:stretch>
+        </p:blipFill>
+        <p:spPr bwMode="auto">
+          <a:xfrm>
+            <a:off x="6732240" y="2672580"/>
+            <a:ext cx="2110880" cy="2110880"/>
+          </a:xfrm>
+          <a:prstGeom prst="rect">
+            <a:avLst/>
+          </a:prstGeom>
+          <a:noFill/>
+        </p:spPr>
+      </p:pic>
+      <p:pic>
+        <p:nvPicPr>
+          <p:cNvPr id="9" name="Picture 6" descr="C:\Users\Robin\Documents\GitHub\chado presentation\weitere teebilder\bilberry-774826_1280.png"/>
+          <p:cNvPicPr>
+            <a:picLocks noChangeAspect="1" noChangeArrowheads="1"/>
+          </p:cNvPicPr>
+          <p:nvPr/>
+        </p:nvPicPr>
+        <p:blipFill>
+          <a:blip r:embed="rId6" cstate="print"/>
+          <a:srcRect/>
+          <a:stretch>
+            <a:fillRect/>
+          </a:stretch>
+        </p:blipFill>
+        <p:spPr bwMode="auto">
+          <a:xfrm>
+            <a:off x="107504" y="2672580"/>
+            <a:ext cx="2131418" cy="2131418"/>
+          </a:xfrm>
+          <a:prstGeom prst="rect">
+            <a:avLst/>
+          </a:prstGeom>
+          <a:noFill/>
+        </p:spPr>
+      </p:pic>
     </p:spTree>
   </p:cSld>
   <p:clrMapOvr>
@@ -6174,7 +6278,7 @@
   <p:timing>
     <p:tnLst>
       <p:par>
-        <p:cTn xmlns:p14="http://schemas.microsoft.com/office/powerpoint/2010/main" id="1" dur="indefinite" restart="never" nodeType="tmRoot"/>
+        <p:cTn id="1" dur="indefinite" restart="never" nodeType="tmRoot"/>
       </p:par>
     </p:tnLst>
   </p:timing>
@@ -6253,7 +6357,12 @@
             <p:ph type="title"/>
           </p:nvPr>
         </p:nvSpPr>
-        <p:spPr/>
+        <p:spPr>
+          <a:xfrm>
+            <a:off x="457200" y="418356"/>
+            <a:ext cx="4906888" cy="857250"/>
+          </a:xfrm>
+        </p:spPr>
         <p:txBody>
           <a:bodyPr>
             <a:normAutofit/>
@@ -6262,11 +6371,7 @@
           <a:p>
             <a:r>
               <a:rPr lang="de-DE" dirty="0" smtClean="0"/>
-              <a:t> </a:t>
-            </a:r>
-            <a:r>
-              <a:rPr lang="de-DE" dirty="0" smtClean="0"/>
-              <a:t>SUT (</a:t>
+              <a:t> SUT (</a:t>
             </a:r>
             <a:r>
               <a:rPr lang="de-DE" dirty="0" err="1" smtClean="0"/>
@@ -6288,7 +6393,7 @@
         </p:nvSpPr>
         <p:spPr>
           <a:xfrm>
-            <a:off x="395536" y="1419622"/>
+            <a:off x="395536" y="1673389"/>
             <a:ext cx="8352928" cy="2554545"/>
           </a:xfrm>
           <a:prstGeom prst="rect">
@@ -6768,14 +6873,7 @@
                 <a:latin typeface="Source Code Pro"/>
                 <a:cs typeface="Source Code Pro"/>
               </a:rPr>
-              <a:t>  </a:t>
-            </a:r>
-            <a:r>
-              <a:rPr lang="de-DE" sz="1600" dirty="0" smtClean="0">
-                <a:latin typeface="Source Code Pro"/>
-                <a:cs typeface="Source Code Pro"/>
-              </a:rPr>
-              <a:t>}</a:t>
+              <a:t>  }</a:t>
             </a:r>
             <a:endParaRPr lang="de-DE" sz="1600" dirty="0">
               <a:latin typeface="Source Code Pro"/>
@@ -6797,10 +6895,36 @@
           </a:p>
         </p:txBody>
       </p:sp>
+      <p:pic>
+        <p:nvPicPr>
+          <p:cNvPr id="1026" name="Picture 2" descr="C:\Users\Robin\Documents\GitHub\chado presentation\weitere teebilder\tea-1234832_1280.jpg"/>
+          <p:cNvPicPr>
+            <a:picLocks noChangeAspect="1" noChangeArrowheads="1"/>
+          </p:cNvPicPr>
+          <p:nvPr/>
+        </p:nvPicPr>
+        <p:blipFill>
+          <a:blip r:embed="rId2" cstate="print"/>
+          <a:srcRect/>
+          <a:stretch>
+            <a:fillRect/>
+          </a:stretch>
+        </p:blipFill>
+        <p:spPr bwMode="auto">
+          <a:xfrm>
+            <a:off x="5621592" y="144016"/>
+            <a:ext cx="3414904" cy="2283718"/>
+          </a:xfrm>
+          <a:prstGeom prst="rect">
+            <a:avLst/>
+          </a:prstGeom>
+          <a:noFill/>
+        </p:spPr>
+      </p:pic>
     </p:spTree>
     <p:extLst>
       <p:ext uri="{BB962C8B-B14F-4D97-AF65-F5344CB8AC3E}">
-        <p14:creationId xmlns:p14="http://schemas.microsoft.com/office/powerpoint/2010/main" val="3075067597"/>
+        <p14:creationId xmlns:p14="http://schemas.microsoft.com/office/powerpoint/2010/main" xmlns="" val="3075067597"/>
       </p:ext>
     </p:extLst>
   </p:cSld>
@@ -6810,7 +6934,7 @@
   <p:timing>
     <p:tnLst>
       <p:par>
-        <p:cTn xmlns:p14="http://schemas.microsoft.com/office/powerpoint/2010/main" id="1" dur="indefinite" restart="never" nodeType="tmRoot"/>
+        <p:cTn id="1" dur="indefinite" restart="never" nodeType="tmRoot"/>
       </p:par>
     </p:tnLst>
   </p:timing>
@@ -6917,7 +7041,7 @@
           </p:nvPr>
         </p:nvPicPr>
         <p:blipFill>
-          <a:blip r:embed="rId2"/>
+          <a:blip r:embed="rId2" cstate="print"/>
           <a:srcRect l="-24001" r="-24001"/>
           <a:stretch>
             <a:fillRect/>
@@ -7015,10 +7139,36 @@
           </a:p>
         </p:txBody>
       </p:sp>
+      <p:pic>
+        <p:nvPicPr>
+          <p:cNvPr id="6" name="Picture 6" descr="C:\Users\Robin\Documents\GitHub\chado presentation\weitere teebilder\bilberry-774826_1280.png"/>
+          <p:cNvPicPr>
+            <a:picLocks noChangeAspect="1" noChangeArrowheads="1"/>
+          </p:cNvPicPr>
+          <p:nvPr/>
+        </p:nvPicPr>
+        <p:blipFill>
+          <a:blip r:embed="rId4" cstate="print"/>
+          <a:srcRect/>
+          <a:stretch>
+            <a:fillRect/>
+          </a:stretch>
+        </p:blipFill>
+        <p:spPr bwMode="auto">
+          <a:xfrm>
+            <a:off x="6977086" y="-452586"/>
+            <a:ext cx="2131418" cy="2131418"/>
+          </a:xfrm>
+          <a:prstGeom prst="rect">
+            <a:avLst/>
+          </a:prstGeom>
+          <a:noFill/>
+        </p:spPr>
+      </p:pic>
     </p:spTree>
     <p:extLst>
       <p:ext uri="{BB962C8B-B14F-4D97-AF65-F5344CB8AC3E}">
-        <p14:creationId xmlns:p14="http://schemas.microsoft.com/office/powerpoint/2010/main" val="149987943"/>
+        <p14:creationId xmlns:p14="http://schemas.microsoft.com/office/powerpoint/2010/main" xmlns="" val="149987943"/>
       </p:ext>
     </p:extLst>
   </p:cSld>
@@ -7028,7 +7178,7 @@
   <p:timing>
     <p:tnLst>
       <p:par>
-        <p:cTn xmlns:p14="http://schemas.microsoft.com/office/powerpoint/2010/main" id="1" dur="indefinite" restart="never" nodeType="tmRoot"/>
+        <p:cTn id="1" dur="indefinite" restart="never" nodeType="tmRoot"/>
       </p:par>
     </p:tnLst>
   </p:timing>
@@ -7054,7 +7204,7 @@
       </p:grpSpPr>
       <p:sp>
         <p:nvSpPr>
-          <p:cNvPr id="5" name="Rechteck 4"/>
+          <p:cNvPr id="8" name="Rechteck 7"/>
           <p:cNvSpPr/>
           <p:nvPr/>
         </p:nvSpPr>
@@ -7470,10 +7620,36 @@
           </a:p>
         </p:txBody>
       </p:sp>
+      <p:pic>
+        <p:nvPicPr>
+          <p:cNvPr id="7" name="Picture 6" descr="C:\Users\Robin\Documents\GitHub\chado presentation\weitere teebilder\bilberry-774826_1280.png"/>
+          <p:cNvPicPr>
+            <a:picLocks noChangeAspect="1" noChangeArrowheads="1"/>
+          </p:cNvPicPr>
+          <p:nvPr/>
+        </p:nvPicPr>
+        <p:blipFill>
+          <a:blip r:embed="rId2" cstate="print"/>
+          <a:srcRect/>
+          <a:stretch>
+            <a:fillRect/>
+          </a:stretch>
+        </p:blipFill>
+        <p:spPr bwMode="auto">
+          <a:xfrm>
+            <a:off x="6977086" y="-452586"/>
+            <a:ext cx="2131418" cy="2131418"/>
+          </a:xfrm>
+          <a:prstGeom prst="rect">
+            <a:avLst/>
+          </a:prstGeom>
+          <a:noFill/>
+        </p:spPr>
+      </p:pic>
     </p:spTree>
     <p:extLst>
       <p:ext uri="{BB962C8B-B14F-4D97-AF65-F5344CB8AC3E}">
-        <p14:creationId xmlns:p14="http://schemas.microsoft.com/office/powerpoint/2010/main" val="890252917"/>
+        <p14:creationId xmlns:p14="http://schemas.microsoft.com/office/powerpoint/2010/main" xmlns="" val="890252917"/>
       </p:ext>
     </p:extLst>
   </p:cSld>
@@ -7483,7 +7659,7 @@
   <p:timing>
     <p:tnLst>
       <p:par>
-        <p:cTn xmlns:p14="http://schemas.microsoft.com/office/powerpoint/2010/main" id="1" dur="indefinite" restart="never" nodeType="tmRoot"/>
+        <p:cTn id="1" dur="indefinite" restart="never" nodeType="tmRoot"/>
       </p:par>
     </p:tnLst>
   </p:timing>
@@ -7684,7 +7860,7 @@
           </p:nvPr>
         </p:nvPicPr>
         <p:blipFill>
-          <a:blip r:embed="rId3"/>
+          <a:blip r:embed="rId3" cstate="print"/>
           <a:srcRect l="-21264" r="-21264"/>
           <a:stretch>
             <a:fillRect/>
@@ -7692,10 +7868,36 @@
         </p:blipFill>
         <p:spPr/>
       </p:pic>
+      <p:pic>
+        <p:nvPicPr>
+          <p:cNvPr id="9" name="Picture 3" descr="C:\Users\Robin\Documents\GitHub\chado presentation\weitere teebilder\flowers-774816_1280.png"/>
+          <p:cNvPicPr>
+            <a:picLocks noChangeAspect="1" noChangeArrowheads="1"/>
+          </p:cNvPicPr>
+          <p:nvPr/>
+        </p:nvPicPr>
+        <p:blipFill>
+          <a:blip r:embed="rId4" cstate="print"/>
+          <a:srcRect/>
+          <a:stretch>
+            <a:fillRect/>
+          </a:stretch>
+        </p:blipFill>
+        <p:spPr bwMode="auto">
+          <a:xfrm>
+            <a:off x="6989340" y="-452586"/>
+            <a:ext cx="2119164" cy="2119164"/>
+          </a:xfrm>
+          <a:prstGeom prst="rect">
+            <a:avLst/>
+          </a:prstGeom>
+          <a:noFill/>
+        </p:spPr>
+      </p:pic>
     </p:spTree>
     <p:extLst>
       <p:ext uri="{BB962C8B-B14F-4D97-AF65-F5344CB8AC3E}">
-        <p14:creationId xmlns:p14="http://schemas.microsoft.com/office/powerpoint/2010/main" val="3919436087"/>
+        <p14:creationId xmlns:p14="http://schemas.microsoft.com/office/powerpoint/2010/main" xmlns="" val="3919436087"/>
       </p:ext>
     </p:extLst>
   </p:cSld>
@@ -7705,7 +7907,7 @@
   <p:timing>
     <p:tnLst>
       <p:par>
-        <p:cTn xmlns:p14="http://schemas.microsoft.com/office/powerpoint/2010/main" id="1" dur="indefinite" restart="never" nodeType="tmRoot"/>
+        <p:cTn id="1" dur="indefinite" restart="never" nodeType="tmRoot"/>
       </p:par>
     </p:tnLst>
   </p:timing>
@@ -8287,10 +8489,36 @@
           </a:p>
         </p:txBody>
       </p:sp>
+      <p:pic>
+        <p:nvPicPr>
+          <p:cNvPr id="8" name="Picture 3" descr="C:\Users\Robin\Documents\GitHub\chado presentation\weitere teebilder\flowers-774816_1280.png"/>
+          <p:cNvPicPr>
+            <a:picLocks noChangeAspect="1" noChangeArrowheads="1"/>
+          </p:cNvPicPr>
+          <p:nvPr/>
+        </p:nvPicPr>
+        <p:blipFill>
+          <a:blip r:embed="rId2" cstate="print"/>
+          <a:srcRect/>
+          <a:stretch>
+            <a:fillRect/>
+          </a:stretch>
+        </p:blipFill>
+        <p:spPr bwMode="auto">
+          <a:xfrm>
+            <a:off x="6989340" y="-452586"/>
+            <a:ext cx="2119164" cy="2119164"/>
+          </a:xfrm>
+          <a:prstGeom prst="rect">
+            <a:avLst/>
+          </a:prstGeom>
+          <a:noFill/>
+        </p:spPr>
+      </p:pic>
     </p:spTree>
     <p:extLst>
       <p:ext uri="{BB962C8B-B14F-4D97-AF65-F5344CB8AC3E}">
-        <p14:creationId xmlns:p14="http://schemas.microsoft.com/office/powerpoint/2010/main" val="401687663"/>
+        <p14:creationId xmlns:p14="http://schemas.microsoft.com/office/powerpoint/2010/main" xmlns="" val="401687663"/>
       </p:ext>
     </p:extLst>
   </p:cSld>
@@ -8300,7 +8528,7 @@
   <p:timing>
     <p:tnLst>
       <p:par>
-        <p:cTn xmlns:p14="http://schemas.microsoft.com/office/powerpoint/2010/main" id="1" dur="indefinite" restart="never" nodeType="tmRoot"/>
+        <p:cTn id="1" dur="indefinite" restart="never" nodeType="tmRoot"/>
       </p:par>
     </p:tnLst>
   </p:timing>
@@ -8493,7 +8721,7 @@
           </p:nvPr>
         </p:nvPicPr>
         <p:blipFill>
-          <a:blip r:embed="rId3"/>
+          <a:blip r:embed="rId3" cstate="print"/>
           <a:srcRect l="-19236" r="-19236"/>
           <a:stretch>
             <a:fillRect/>
@@ -8501,10 +8729,36 @@
         </p:blipFill>
         <p:spPr/>
       </p:pic>
+      <p:pic>
+        <p:nvPicPr>
+          <p:cNvPr id="11" name="Picture 4" descr="C:\Users\Robin\Documents\GitHub\chado presentation\weitere teebilder\dried-flower-782768_1280.png"/>
+          <p:cNvPicPr>
+            <a:picLocks noChangeAspect="1" noChangeArrowheads="1"/>
+          </p:cNvPicPr>
+          <p:nvPr/>
+        </p:nvPicPr>
+        <p:blipFill>
+          <a:blip r:embed="rId4" cstate="print"/>
+          <a:srcRect/>
+          <a:stretch>
+            <a:fillRect/>
+          </a:stretch>
+        </p:blipFill>
+        <p:spPr bwMode="auto">
+          <a:xfrm>
+            <a:off x="7056784" y="-524594"/>
+            <a:ext cx="2051720" cy="2051720"/>
+          </a:xfrm>
+          <a:prstGeom prst="rect">
+            <a:avLst/>
+          </a:prstGeom>
+          <a:noFill/>
+        </p:spPr>
+      </p:pic>
     </p:spTree>
     <p:extLst>
       <p:ext uri="{BB962C8B-B14F-4D97-AF65-F5344CB8AC3E}">
-        <p14:creationId xmlns:p14="http://schemas.microsoft.com/office/powerpoint/2010/main" val="3729958523"/>
+        <p14:creationId xmlns:p14="http://schemas.microsoft.com/office/powerpoint/2010/main" xmlns="" val="3729958523"/>
       </p:ext>
     </p:extLst>
   </p:cSld>
@@ -8514,7 +8768,7 @@
   <p:timing>
     <p:tnLst>
       <p:par>
-        <p:cTn xmlns:p14="http://schemas.microsoft.com/office/powerpoint/2010/main" id="1" dur="indefinite" restart="never" nodeType="tmRoot"/>
+        <p:cTn id="1" dur="indefinite" restart="never" nodeType="tmRoot"/>
       </p:par>
     </p:tnLst>
   </p:timing>
@@ -9242,10 +9496,36 @@
           </a:p>
         </p:txBody>
       </p:sp>
+      <p:pic>
+        <p:nvPicPr>
+          <p:cNvPr id="8" name="Picture 4" descr="C:\Users\Robin\Documents\GitHub\chado presentation\weitere teebilder\dried-flower-782768_1280.png"/>
+          <p:cNvPicPr>
+            <a:picLocks noChangeAspect="1" noChangeArrowheads="1"/>
+          </p:cNvPicPr>
+          <p:nvPr/>
+        </p:nvPicPr>
+        <p:blipFill>
+          <a:blip r:embed="rId2" cstate="print"/>
+          <a:srcRect/>
+          <a:stretch>
+            <a:fillRect/>
+          </a:stretch>
+        </p:blipFill>
+        <p:spPr bwMode="auto">
+          <a:xfrm>
+            <a:off x="7056784" y="-524594"/>
+            <a:ext cx="2051720" cy="2051720"/>
+          </a:xfrm>
+          <a:prstGeom prst="rect">
+            <a:avLst/>
+          </a:prstGeom>
+          <a:noFill/>
+        </p:spPr>
+      </p:pic>
     </p:spTree>
     <p:extLst>
       <p:ext uri="{BB962C8B-B14F-4D97-AF65-F5344CB8AC3E}">
-        <p14:creationId xmlns:p14="http://schemas.microsoft.com/office/powerpoint/2010/main" val="1162914699"/>
+        <p14:creationId xmlns:p14="http://schemas.microsoft.com/office/powerpoint/2010/main" xmlns="" val="1162914699"/>
       </p:ext>
     </p:extLst>
   </p:cSld>
@@ -9255,7 +9535,7 @@
   <p:timing>
     <p:tnLst>
       <p:par>
-        <p:cTn xmlns:p14="http://schemas.microsoft.com/office/powerpoint/2010/main" id="1" dur="indefinite" restart="never" nodeType="tmRoot"/>
+        <p:cTn id="1" dur="indefinite" restart="never" nodeType="tmRoot"/>
       </p:par>
     </p:tnLst>
   </p:timing>
@@ -9472,7 +9752,7 @@
   <p:timing>
     <p:tnLst>
       <p:par>
-        <p:cTn xmlns:p14="http://schemas.microsoft.com/office/powerpoint/2010/main" id="1" dur="indefinite" restart="never" nodeType="tmRoot"/>
+        <p:cTn id="1" dur="indefinite" restart="never" nodeType="tmRoot"/>
       </p:par>
     </p:tnLst>
   </p:timing>
@@ -9661,7 +9941,7 @@
           </p:nvPr>
         </p:nvPicPr>
         <p:blipFill>
-          <a:blip r:embed="rId3"/>
+          <a:blip r:embed="rId3" cstate="print"/>
           <a:srcRect l="-19236" r="-19236"/>
           <a:stretch>
             <a:fillRect/>
@@ -9669,10 +9949,36 @@
         </p:blipFill>
         <p:spPr/>
       </p:pic>
+      <p:pic>
+        <p:nvPicPr>
+          <p:cNvPr id="6" name="Picture 5" descr="C:\Users\Robin\Documents\GitHub\chado presentation\weitere teebilder\dried-774823_1280.png"/>
+          <p:cNvPicPr>
+            <a:picLocks noChangeAspect="1" noChangeArrowheads="1"/>
+          </p:cNvPicPr>
+          <p:nvPr/>
+        </p:nvPicPr>
+        <p:blipFill>
+          <a:blip r:embed="rId4" cstate="print"/>
+          <a:srcRect/>
+          <a:stretch>
+            <a:fillRect/>
+          </a:stretch>
+        </p:blipFill>
+        <p:spPr bwMode="auto">
+          <a:xfrm>
+            <a:off x="6997624" y="-452586"/>
+            <a:ext cx="2110880" cy="2110880"/>
+          </a:xfrm>
+          <a:prstGeom prst="rect">
+            <a:avLst/>
+          </a:prstGeom>
+          <a:noFill/>
+        </p:spPr>
+      </p:pic>
     </p:spTree>
     <p:extLst>
       <p:ext uri="{BB962C8B-B14F-4D97-AF65-F5344CB8AC3E}">
-        <p14:creationId xmlns:p14="http://schemas.microsoft.com/office/powerpoint/2010/main" val="1569405094"/>
+        <p14:creationId xmlns:p14="http://schemas.microsoft.com/office/powerpoint/2010/main" xmlns="" val="1569405094"/>
       </p:ext>
     </p:extLst>
   </p:cSld>
@@ -9682,7 +9988,7 @@
   <p:timing>
     <p:tnLst>
       <p:par>
-        <p:cTn xmlns:p14="http://schemas.microsoft.com/office/powerpoint/2010/main" id="1" dur="indefinite" restart="never" nodeType="tmRoot"/>
+        <p:cTn id="1" dur="indefinite" restart="never" nodeType="tmRoot"/>
       </p:par>
     </p:tnLst>
   </p:timing>
@@ -10163,10 +10469,36 @@
           </a:p>
         </p:txBody>
       </p:sp>
+      <p:pic>
+        <p:nvPicPr>
+          <p:cNvPr id="6" name="Picture 5" descr="C:\Users\Robin\Documents\GitHub\chado presentation\weitere teebilder\dried-774823_1280.png"/>
+          <p:cNvPicPr>
+            <a:picLocks noChangeAspect="1" noChangeArrowheads="1"/>
+          </p:cNvPicPr>
+          <p:nvPr/>
+        </p:nvPicPr>
+        <p:blipFill>
+          <a:blip r:embed="rId2" cstate="print"/>
+          <a:srcRect/>
+          <a:stretch>
+            <a:fillRect/>
+          </a:stretch>
+        </p:blipFill>
+        <p:spPr bwMode="auto">
+          <a:xfrm>
+            <a:off x="6997624" y="-452586"/>
+            <a:ext cx="2110880" cy="2110880"/>
+          </a:xfrm>
+          <a:prstGeom prst="rect">
+            <a:avLst/>
+          </a:prstGeom>
+          <a:noFill/>
+        </p:spPr>
+      </p:pic>
     </p:spTree>
     <p:extLst>
       <p:ext uri="{BB962C8B-B14F-4D97-AF65-F5344CB8AC3E}">
-        <p14:creationId xmlns:p14="http://schemas.microsoft.com/office/powerpoint/2010/main" val="2016165428"/>
+        <p14:creationId xmlns:p14="http://schemas.microsoft.com/office/powerpoint/2010/main" xmlns="" val="2016165428"/>
       </p:ext>
     </p:extLst>
   </p:cSld>
@@ -10176,7 +10508,7 @@
   <p:timing>
     <p:tnLst>
       <p:par>
-        <p:cTn xmlns:p14="http://schemas.microsoft.com/office/powerpoint/2010/main" id="1" dur="indefinite" restart="never" nodeType="tmRoot"/>
+        <p:cTn id="1" dur="indefinite" restart="never" nodeType="tmRoot"/>
       </p:par>
     </p:tnLst>
   </p:timing>
@@ -10200,51 +10532,110 @@
           <a:chExt cx="0" cy="0"/>
         </a:xfrm>
       </p:grpSpPr>
-      <p:sp>
-        <p:nvSpPr>
-          <p:cNvPr id="5" name="Rechteck 4"/>
-          <p:cNvSpPr/>
+      <p:pic>
+        <p:nvPicPr>
+          <p:cNvPr id="11" name="Picture 3" descr="C:\Users\Robin\Documents\GitHub\chado presentation\weitere teebilder\flowers-774816_1280.png"/>
+          <p:cNvPicPr>
+            <a:picLocks noChangeAspect="1" noChangeArrowheads="1"/>
+          </p:cNvPicPr>
           <p:nvPr/>
-        </p:nvSpPr>
-        <p:spPr>
+        </p:nvPicPr>
+        <p:blipFill>
+          <a:blip r:embed="rId3" cstate="print"/>
+          <a:srcRect/>
+          <a:stretch>
+            <a:fillRect/>
+          </a:stretch>
+        </p:blipFill>
+        <p:spPr bwMode="auto">
           <a:xfrm>
-            <a:off x="0" y="0"/>
-            <a:ext cx="9144000" cy="5143500"/>
+            <a:off x="2339752" y="1592460"/>
+            <a:ext cx="2119164" cy="2119164"/>
           </a:xfrm>
           <a:prstGeom prst="rect">
             <a:avLst/>
           </a:prstGeom>
-          <a:solidFill>
-            <a:schemeClr val="bg1">
-              <a:alpha val="74000"/>
-            </a:schemeClr>
-          </a:solidFill>
+          <a:noFill/>
         </p:spPr>
-        <p:style>
-          <a:lnRef idx="2">
-            <a:schemeClr val="accent1">
-              <a:shade val="50000"/>
-            </a:schemeClr>
-          </a:lnRef>
-          <a:fillRef idx="1">
-            <a:schemeClr val="accent1"/>
-          </a:fillRef>
-          <a:effectRef idx="0">
-            <a:schemeClr val="accent1"/>
-          </a:effectRef>
-          <a:fontRef idx="minor">
-            <a:schemeClr val="lt1"/>
-          </a:fontRef>
-        </p:style>
-        <p:txBody>
-          <a:bodyPr rtlCol="0" anchor="ctr"/>
-          <a:lstStyle/>
-          <a:p>
-            <a:pPr algn="ctr"/>
-            <a:endParaRPr lang="de-DE"/>
-          </a:p>
-        </p:txBody>
-      </p:sp>
+      </p:pic>
+      <p:pic>
+        <p:nvPicPr>
+          <p:cNvPr id="12" name="Picture 4" descr="C:\Users\Robin\Documents\GitHub\chado presentation\weitere teebilder\dried-flower-782768_1280.png"/>
+          <p:cNvPicPr>
+            <a:picLocks noChangeAspect="1" noChangeArrowheads="1"/>
+          </p:cNvPicPr>
+          <p:nvPr/>
+        </p:nvPicPr>
+        <p:blipFill>
+          <a:blip r:embed="rId4" cstate="print"/>
+          <a:srcRect/>
+          <a:stretch>
+            <a:fillRect/>
+          </a:stretch>
+        </p:blipFill>
+        <p:spPr bwMode="auto">
+          <a:xfrm>
+            <a:off x="4572000" y="1592460"/>
+            <a:ext cx="2051720" cy="2051720"/>
+          </a:xfrm>
+          <a:prstGeom prst="rect">
+            <a:avLst/>
+          </a:prstGeom>
+          <a:noFill/>
+        </p:spPr>
+      </p:pic>
+      <p:pic>
+        <p:nvPicPr>
+          <p:cNvPr id="13" name="Picture 5" descr="C:\Users\Robin\Documents\GitHub\chado presentation\weitere teebilder\dried-774823_1280.png"/>
+          <p:cNvPicPr>
+            <a:picLocks noChangeAspect="1" noChangeArrowheads="1"/>
+          </p:cNvPicPr>
+          <p:nvPr/>
+        </p:nvPicPr>
+        <p:blipFill>
+          <a:blip r:embed="rId5" cstate="print"/>
+          <a:srcRect/>
+          <a:stretch>
+            <a:fillRect/>
+          </a:stretch>
+        </p:blipFill>
+        <p:spPr bwMode="auto">
+          <a:xfrm>
+            <a:off x="6732240" y="1592460"/>
+            <a:ext cx="2110880" cy="2110880"/>
+          </a:xfrm>
+          <a:prstGeom prst="rect">
+            <a:avLst/>
+          </a:prstGeom>
+          <a:noFill/>
+        </p:spPr>
+      </p:pic>
+      <p:pic>
+        <p:nvPicPr>
+          <p:cNvPr id="14" name="Picture 6" descr="C:\Users\Robin\Documents\GitHub\chado presentation\weitere teebilder\bilberry-774826_1280.png"/>
+          <p:cNvPicPr>
+            <a:picLocks noChangeAspect="1" noChangeArrowheads="1"/>
+          </p:cNvPicPr>
+          <p:nvPr/>
+        </p:nvPicPr>
+        <p:blipFill>
+          <a:blip r:embed="rId6" cstate="print"/>
+          <a:srcRect/>
+          <a:stretch>
+            <a:fillRect/>
+          </a:stretch>
+        </p:blipFill>
+        <p:spPr bwMode="auto">
+          <a:xfrm>
+            <a:off x="107504" y="1592460"/>
+            <a:ext cx="2131418" cy="2131418"/>
+          </a:xfrm>
+          <a:prstGeom prst="rect">
+            <a:avLst/>
+          </a:prstGeom>
+          <a:noFill/>
+        </p:spPr>
+      </p:pic>
       <p:sp>
         <p:nvSpPr>
           <p:cNvPr id="2" name="Titel 1"/>
@@ -10408,7 +10799,7 @@
     </p:spTree>
     <p:extLst>
       <p:ext uri="{BB962C8B-B14F-4D97-AF65-F5344CB8AC3E}">
-        <p14:creationId xmlns:p14="http://schemas.microsoft.com/office/powerpoint/2010/main" val="341076260"/>
+        <p14:creationId xmlns:p14="http://schemas.microsoft.com/office/powerpoint/2010/main" xmlns="" val="341076260"/>
       </p:ext>
     </p:extLst>
   </p:cSld>
@@ -10418,7 +10809,7 @@
   <p:timing>
     <p:tnLst>
       <p:par>
-        <p:cTn xmlns:p14="http://schemas.microsoft.com/office/powerpoint/2010/main" id="1" dur="indefinite" restart="never" nodeType="tmRoot">
+        <p:cTn id="1" dur="indefinite" restart="never" nodeType="tmRoot">
           <p:childTnLst>
             <p:seq concurrent="1" nextAc="seek">
               <p:cTn id="2" dur="indefinite" nodeType="mainSeq">
@@ -11195,14 +11586,7 @@
                 <a:latin typeface="Source Code Pro"/>
                 <a:cs typeface="Source Code Pro"/>
               </a:rPr>
-              <a:t>(</a:t>
-            </a:r>
-            <a:r>
-              <a:rPr lang="de-DE" sz="1600" dirty="0" smtClean="0">
-                <a:latin typeface="Source Code Pro"/>
-                <a:cs typeface="Source Code Pro"/>
-              </a:rPr>
-              <a:t>), </a:t>
+              <a:t>(), </a:t>
             </a:r>
             <a:r>
               <a:rPr lang="de-DE" sz="1600" i="1" dirty="0" err="1" smtClean="0">
@@ -11257,10 +11641,36 @@
           </a:p>
         </p:txBody>
       </p:sp>
+      <p:pic>
+        <p:nvPicPr>
+          <p:cNvPr id="2050" name="Picture 2" descr="C:\Users\Robin\Documents\GitHub\chado presentation\weitere teebilder\tableware-832035_640.jpg"/>
+          <p:cNvPicPr>
+            <a:picLocks noChangeAspect="1" noChangeArrowheads="1"/>
+          </p:cNvPicPr>
+          <p:nvPr/>
+        </p:nvPicPr>
+        <p:blipFill>
+          <a:blip r:embed="rId2" cstate="print"/>
+          <a:srcRect/>
+          <a:stretch>
+            <a:fillRect/>
+          </a:stretch>
+        </p:blipFill>
+        <p:spPr bwMode="auto">
+          <a:xfrm>
+            <a:off x="5110157" y="1923678"/>
+            <a:ext cx="4033844" cy="3075806"/>
+          </a:xfrm>
+          <a:prstGeom prst="rect">
+            <a:avLst/>
+          </a:prstGeom>
+          <a:noFill/>
+        </p:spPr>
+      </p:pic>
     </p:spTree>
     <p:extLst>
       <p:ext uri="{BB962C8B-B14F-4D97-AF65-F5344CB8AC3E}">
-        <p14:creationId xmlns:p14="http://schemas.microsoft.com/office/powerpoint/2010/main" val="3433374058"/>
+        <p14:creationId xmlns:p14="http://schemas.microsoft.com/office/powerpoint/2010/main" xmlns="" val="3433374058"/>
       </p:ext>
     </p:extLst>
   </p:cSld>
@@ -11270,7 +11680,7 @@
   <p:timing>
     <p:tnLst>
       <p:par>
-        <p:cTn xmlns:p14="http://schemas.microsoft.com/office/powerpoint/2010/main" id="1" dur="indefinite" restart="never" nodeType="tmRoot"/>
+        <p:cTn id="1" dur="indefinite" restart="never" nodeType="tmRoot"/>
       </p:par>
     </p:tnLst>
   </p:timing>
@@ -12721,7 +13131,7 @@
   <p:timing>
     <p:tnLst>
       <p:par>
-        <p:cTn xmlns:p14="http://schemas.microsoft.com/office/powerpoint/2010/main" id="1" dur="indefinite" restart="never" nodeType="tmRoot">
+        <p:cTn id="1" dur="indefinite" restart="never" nodeType="tmRoot">
           <p:childTnLst>
             <p:seq concurrent="1" nextAc="seek">
               <p:cTn id="2" dur="indefinite" nodeType="mainSeq">
@@ -15367,7 +15777,7 @@
   <p:timing>
     <p:tnLst>
       <p:par>
-        <p:cTn xmlns:p14="http://schemas.microsoft.com/office/powerpoint/2010/main" id="1" dur="indefinite" restart="never" nodeType="tmRoot">
+        <p:cTn id="1" dur="indefinite" restart="never" nodeType="tmRoot">
           <p:childTnLst>
             <p:seq concurrent="1" nextAc="seek">
               <p:cTn id="2" dur="indefinite" nodeType="mainSeq">
@@ -18130,7 +18540,7 @@
   <p:timing>
     <p:tnLst>
       <p:par>
-        <p:cTn xmlns:p14="http://schemas.microsoft.com/office/powerpoint/2010/main" id="1" dur="indefinite" restart="never" nodeType="tmRoot"/>
+        <p:cTn id="1" dur="indefinite" restart="never" nodeType="tmRoot"/>
       </p:par>
     </p:tnLst>
   </p:timing>
@@ -20673,7 +21083,7 @@
   <p:timing>
     <p:tnLst>
       <p:par>
-        <p:cTn xmlns:p14="http://schemas.microsoft.com/office/powerpoint/2010/main" id="1" dur="indefinite" restart="never" nodeType="tmRoot">
+        <p:cTn id="1" dur="indefinite" restart="never" nodeType="tmRoot">
           <p:childTnLst>
             <p:seq concurrent="1" nextAc="seek">
               <p:cTn id="2" dur="indefinite" nodeType="mainSeq">
@@ -21189,7 +21599,7 @@
   <p:timing>
     <p:tnLst>
       <p:par>
-        <p:cTn xmlns:p14="http://schemas.microsoft.com/office/powerpoint/2010/main" id="1" dur="indefinite" restart="never" nodeType="tmRoot">
+        <p:cTn id="1" dur="indefinite" restart="never" nodeType="tmRoot">
           <p:childTnLst>
             <p:seq concurrent="1" nextAc="seek">
               <p:cTn id="2" dur="indefinite" nodeType="mainSeq">
@@ -21645,7 +22055,7 @@
   <p:timing>
     <p:tnLst>
       <p:par>
-        <p:cTn xmlns:p14="http://schemas.microsoft.com/office/powerpoint/2010/main" id="1" dur="indefinite" restart="never" nodeType="tmRoot"/>
+        <p:cTn id="1" dur="indefinite" restart="never" nodeType="tmRoot"/>
       </p:par>
     </p:tnLst>
   </p:timing>
@@ -21894,7 +22304,7 @@
     </p:spTree>
     <p:extLst>
       <p:ext uri="{BB962C8B-B14F-4D97-AF65-F5344CB8AC3E}">
-        <p14:creationId xmlns:p14="http://schemas.microsoft.com/office/powerpoint/2010/main" val="2268789953"/>
+        <p14:creationId xmlns:p14="http://schemas.microsoft.com/office/powerpoint/2010/main" xmlns="" val="2268789953"/>
       </p:ext>
     </p:extLst>
   </p:cSld>
@@ -21904,7 +22314,7 @@
   <p:timing>
     <p:tnLst>
       <p:par>
-        <p:cTn xmlns:p14="http://schemas.microsoft.com/office/powerpoint/2010/main" id="1" dur="indefinite" restart="never" nodeType="tmRoot"/>
+        <p:cTn id="1" dur="indefinite" restart="never" nodeType="tmRoot"/>
       </p:par>
     </p:tnLst>
   </p:timing>
@@ -22121,7 +22531,7 @@
   <p:timing>
     <p:tnLst>
       <p:par>
-        <p:cTn xmlns:p14="http://schemas.microsoft.com/office/powerpoint/2010/main" id="1" dur="indefinite" restart="never" nodeType="tmRoot"/>
+        <p:cTn id="1" dur="indefinite" restart="never" nodeType="tmRoot"/>
       </p:par>
     </p:tnLst>
   </p:timing>
@@ -24075,7 +24485,7 @@
   <p:timing>
     <p:tnLst>
       <p:par>
-        <p:cTn xmlns:p14="http://schemas.microsoft.com/office/powerpoint/2010/main" id="1" dur="indefinite" restart="never" nodeType="tmRoot">
+        <p:cTn id="1" dur="indefinite" restart="never" nodeType="tmRoot">
           <p:childTnLst>
             <p:seq concurrent="1" nextAc="seek">
               <p:cTn id="2" dur="indefinite" nodeType="mainSeq">
@@ -25265,7 +25675,7 @@
   <p:timing>
     <p:tnLst>
       <p:par>
-        <p:cTn xmlns:p14="http://schemas.microsoft.com/office/powerpoint/2010/main" id="1" dur="indefinite" restart="never" nodeType="tmRoot"/>
+        <p:cTn id="1" dur="indefinite" restart="never" nodeType="tmRoot"/>
       </p:par>
     </p:tnLst>
   </p:timing>
@@ -26421,7 +26831,7 @@
   <p:timing>
     <p:tnLst>
       <p:par>
-        <p:cTn xmlns:p14="http://schemas.microsoft.com/office/powerpoint/2010/main" id="1" dur="indefinite" restart="never" nodeType="tmRoot">
+        <p:cTn id="1" dur="indefinite" restart="never" nodeType="tmRoot">
           <p:childTnLst>
             <p:seq concurrent="1" nextAc="seek">
               <p:cTn id="2" dur="indefinite" nodeType="mainSeq">
@@ -27758,7 +28168,7 @@
   <p:timing>
     <p:tnLst>
       <p:par>
-        <p:cTn xmlns:p14="http://schemas.microsoft.com/office/powerpoint/2010/main" id="1" dur="indefinite" restart="never" nodeType="tmRoot"/>
+        <p:cTn id="1" dur="indefinite" restart="never" nodeType="tmRoot"/>
       </p:par>
     </p:tnLst>
   </p:timing>
@@ -27855,7 +28265,7 @@
   <p:timing>
     <p:tnLst>
       <p:par>
-        <p:cTn xmlns:p14="http://schemas.microsoft.com/office/powerpoint/2010/main" id="1" dur="indefinite" restart="never" nodeType="tmRoot"/>
+        <p:cTn id="1" dur="indefinite" restart="never" nodeType="tmRoot"/>
       </p:par>
     </p:tnLst>
   </p:timing>
@@ -29493,7 +29903,7 @@
   <p:timing>
     <p:tnLst>
       <p:par>
-        <p:cTn xmlns:p14="http://schemas.microsoft.com/office/powerpoint/2010/main" id="1" dur="indefinite" restart="never" nodeType="tmRoot"/>
+        <p:cTn id="1" dur="indefinite" restart="never" nodeType="tmRoot"/>
       </p:par>
     </p:tnLst>
   </p:timing>
@@ -31549,7 +31959,7 @@
   <p:timing>
     <p:tnLst>
       <p:par>
-        <p:cTn xmlns:p14="http://schemas.microsoft.com/office/powerpoint/2010/main" id="1" dur="indefinite" restart="never" nodeType="tmRoot"/>
+        <p:cTn id="1" dur="indefinite" restart="never" nodeType="tmRoot"/>
       </p:par>
     </p:tnLst>
   </p:timing>
@@ -31646,7 +32056,7 @@
   <p:timing>
     <p:tnLst>
       <p:par>
-        <p:cTn xmlns:p14="http://schemas.microsoft.com/office/powerpoint/2010/main" id="1" dur="indefinite" restart="never" nodeType="tmRoot"/>
+        <p:cTn id="1" dur="indefinite" restart="never" nodeType="tmRoot"/>
       </p:par>
     </p:tnLst>
   </p:timing>
@@ -32092,7 +32502,7 @@
   <p:timing>
     <p:tnLst>
       <p:par>
-        <p:cTn xmlns:p14="http://schemas.microsoft.com/office/powerpoint/2010/main" id="1" dur="indefinite" restart="never" nodeType="tmRoot"/>
+        <p:cTn id="1" dur="indefinite" restart="never" nodeType="tmRoot"/>
       </p:par>
     </p:tnLst>
   </p:timing>
@@ -32453,7 +32863,7 @@
     </p:spTree>
     <p:extLst>
       <p:ext uri="{BB962C8B-B14F-4D97-AF65-F5344CB8AC3E}">
-        <p14:creationId xmlns:p14="http://schemas.microsoft.com/office/powerpoint/2010/main" val="2260232245"/>
+        <p14:creationId xmlns:p14="http://schemas.microsoft.com/office/powerpoint/2010/main" xmlns="" val="2260232245"/>
       </p:ext>
     </p:extLst>
   </p:cSld>
@@ -32463,7 +32873,7 @@
   <p:timing>
     <p:tnLst>
       <p:par>
-        <p:cTn xmlns:p14="http://schemas.microsoft.com/office/powerpoint/2010/main" id="1" dur="indefinite" restart="never" nodeType="tmRoot"/>
+        <p:cTn id="1" dur="indefinite" restart="never" nodeType="tmRoot"/>
       </p:par>
     </p:tnLst>
   </p:timing>
@@ -32559,7 +32969,7 @@
   <p:timing>
     <p:tnLst>
       <p:par>
-        <p:cTn xmlns:p14="http://schemas.microsoft.com/office/powerpoint/2010/main" id="1" dur="indefinite" restart="never" nodeType="tmRoot"/>
+        <p:cTn id="1" dur="indefinite" restart="never" nodeType="tmRoot"/>
       </p:par>
     </p:tnLst>
   </p:timing>
@@ -32674,19 +33084,7 @@
               <a:rPr lang="en-US" sz="1600" dirty="0" smtClean="0">
                 <a:hlinkClick r:id="rId3"/>
               </a:rPr>
-              <a:t>http://blog.thecodewhisperer.com</a:t>
-            </a:r>
-            <a:r>
-              <a:rPr lang="en-US" sz="1600" dirty="0" smtClean="0">
-                <a:hlinkClick r:id="rId3"/>
-              </a:rPr>
-              <a:t>/permalink/</a:t>
-            </a:r>
-            <a:r>
-              <a:rPr lang="en-US" sz="1600" dirty="0" smtClean="0">
-                <a:hlinkClick r:id="rId3"/>
-              </a:rPr>
-              <a:t>integrated-tests-are-a-scam</a:t>
+              <a:t>http://blog.thecodewhisperer.com/permalink/integrated-tests-are-a-scam</a:t>
             </a:r>
             <a:endParaRPr lang="de-DE" dirty="0" smtClean="0"/>
           </a:p>
@@ -32787,7 +33185,7 @@
   <p:timing>
     <p:tnLst>
       <p:par>
-        <p:cTn xmlns:p14="http://schemas.microsoft.com/office/powerpoint/2010/main" id="1" dur="indefinite" restart="never" nodeType="tmRoot"/>
+        <p:cTn id="1" dur="indefinite" restart="never" nodeType="tmRoot"/>
       </p:par>
     </p:tnLst>
   </p:timing>
@@ -33014,7 +33412,7 @@
   <p:timing>
     <p:tnLst>
       <p:par>
-        <p:cTn xmlns:p14="http://schemas.microsoft.com/office/powerpoint/2010/main" id="1" dur="indefinite" restart="never" nodeType="tmRoot"/>
+        <p:cTn id="1" dur="indefinite" restart="never" nodeType="tmRoot"/>
       </p:par>
     </p:tnLst>
   </p:timing>
@@ -33409,7 +33807,7 @@
   <p:timing>
     <p:tnLst>
       <p:par>
-        <p:cTn xmlns:p14="http://schemas.microsoft.com/office/powerpoint/2010/main" id="1" dur="indefinite" restart="never" nodeType="tmRoot"/>
+        <p:cTn id="1" dur="indefinite" restart="never" nodeType="tmRoot"/>
       </p:par>
     </p:tnLst>
   </p:timing>
@@ -33726,7 +34124,7 @@
   <p:timing>
     <p:tnLst>
       <p:par>
-        <p:cTn xmlns:p14="http://schemas.microsoft.com/office/powerpoint/2010/main" id="1" dur="indefinite" restart="never" nodeType="tmRoot"/>
+        <p:cTn id="1" dur="indefinite" restart="never" nodeType="tmRoot"/>
       </p:par>
     </p:tnLst>
   </p:timing>
@@ -33822,7 +34220,7 @@
   <p:timing>
     <p:tnLst>
       <p:par>
-        <p:cTn xmlns:p14="http://schemas.microsoft.com/office/powerpoint/2010/main" id="1" dur="indefinite" restart="never" nodeType="tmRoot"/>
+        <p:cTn id="1" dur="indefinite" restart="never" nodeType="tmRoot"/>
       </p:par>
     </p:tnLst>
   </p:timing>
@@ -34056,7 +34454,7 @@
   <p:timing>
     <p:tnLst>
       <p:par>
-        <p:cTn xmlns:p14="http://schemas.microsoft.com/office/powerpoint/2010/main" id="1" dur="indefinite" restart="never" nodeType="tmRoot"/>
+        <p:cTn id="1" dur="indefinite" restart="never" nodeType="tmRoot"/>
       </p:par>
     </p:tnLst>
   </p:timing>
@@ -34164,7 +34562,7 @@
     </p:spTree>
     <p:extLst>
       <p:ext uri="{BB962C8B-B14F-4D97-AF65-F5344CB8AC3E}">
-        <p14:creationId xmlns:p14="http://schemas.microsoft.com/office/powerpoint/2010/main" val="732667562"/>
+        <p14:creationId xmlns:p14="http://schemas.microsoft.com/office/powerpoint/2010/main" xmlns="" val="732667562"/>
       </p:ext>
     </p:extLst>
   </p:cSld>
@@ -34174,7 +34572,7 @@
   <p:timing>
     <p:tnLst>
       <p:par>
-        <p:cTn xmlns:p14="http://schemas.microsoft.com/office/powerpoint/2010/main" id="1" dur="indefinite" restart="never" nodeType="tmRoot"/>
+        <p:cTn id="1" dur="indefinite" restart="never" nodeType="tmRoot"/>
       </p:par>
     </p:tnLst>
   </p:timing>
@@ -34584,7 +34982,7 @@
     </p:spTree>
     <p:extLst>
       <p:ext uri="{BB962C8B-B14F-4D97-AF65-F5344CB8AC3E}">
-        <p14:creationId xmlns:p14="http://schemas.microsoft.com/office/powerpoint/2010/main" val="391067495"/>
+        <p14:creationId xmlns:p14="http://schemas.microsoft.com/office/powerpoint/2010/main" xmlns="" val="391067495"/>
       </p:ext>
     </p:extLst>
   </p:cSld>
@@ -34594,7 +34992,7 @@
   <p:timing>
     <p:tnLst>
       <p:par>
-        <p:cTn xmlns:p14="http://schemas.microsoft.com/office/powerpoint/2010/main" id="1" dur="indefinite" restart="never" nodeType="tmRoot">
+        <p:cTn id="1" dur="indefinite" restart="never" nodeType="tmRoot">
           <p:childTnLst>
             <p:seq concurrent="1" nextAc="seek">
               <p:cTn id="2" dur="indefinite" nodeType="mainSeq">
@@ -35234,7 +35632,7 @@
     </p:spTree>
     <p:extLst>
       <p:ext uri="{BB962C8B-B14F-4D97-AF65-F5344CB8AC3E}">
-        <p14:creationId xmlns:p14="http://schemas.microsoft.com/office/powerpoint/2010/main" val="2042807844"/>
+        <p14:creationId xmlns:p14="http://schemas.microsoft.com/office/powerpoint/2010/main" xmlns="" val="2042807844"/>
       </p:ext>
     </p:extLst>
   </p:cSld>
@@ -35244,7 +35642,7 @@
   <p:timing>
     <p:tnLst>
       <p:par>
-        <p:cTn xmlns:p14="http://schemas.microsoft.com/office/powerpoint/2010/main" id="1" dur="indefinite" restart="never" nodeType="tmRoot"/>
+        <p:cTn id="1" dur="indefinite" restart="never" nodeType="tmRoot"/>
       </p:par>
     </p:tnLst>
   </p:timing>
@@ -35406,7 +35804,7 @@
   <p:timing>
     <p:tnLst>
       <p:par>
-        <p:cTn xmlns:p14="http://schemas.microsoft.com/office/powerpoint/2010/main" id="1" dur="indefinite" restart="never" nodeType="tmRoot"/>
+        <p:cTn id="1" dur="indefinite" restart="never" nodeType="tmRoot"/>
       </p:par>
     </p:tnLst>
   </p:timing>

</xml_diff>

<commit_message>
fixed display behind image
</commit_message>
<xml_diff>
--- a/chadojs - who is testing the mocks - 16zu9.pptx
+++ b/chadojs - who is testing the mocks - 16zu9.pptx
@@ -239,7 +239,7 @@
             <a:fld id="{4DBE830D-4B1D-43AC-B523-377B51CEDACB}" type="datetimeFigureOut">
               <a:rPr lang="de-DE" smtClean="0"/>
               <a:pPr/>
-              <a:t>18.05.2016</a:t>
+              <a:t>18.05.16</a:t>
             </a:fld>
             <a:endParaRPr lang="de-DE"/>
           </a:p>
@@ -410,7 +410,7 @@
     </p:spTree>
     <p:extLst>
       <p:ext uri="{BB962C8B-B14F-4D97-AF65-F5344CB8AC3E}">
-        <p14:creationId xmlns:p14="http://schemas.microsoft.com/office/powerpoint/2010/main" xmlns="" val="20919523"/>
+        <p14:creationId xmlns:p14="http://schemas.microsoft.com/office/powerpoint/2010/main" val="20919523"/>
       </p:ext>
     </p:extLst>
   </p:cSld>
@@ -1274,7 +1274,7 @@
     </p:spTree>
     <p:extLst>
       <p:ext uri="{BB962C8B-B14F-4D97-AF65-F5344CB8AC3E}">
-        <p14:creationId xmlns:p14="http://schemas.microsoft.com/office/powerpoint/2010/main" xmlns="" val="2883834159"/>
+        <p14:creationId xmlns:p14="http://schemas.microsoft.com/office/powerpoint/2010/main" val="2883834159"/>
       </p:ext>
     </p:extLst>
   </p:cSld>
@@ -1539,7 +1539,7 @@
     </p:spTree>
     <p:extLst>
       <p:ext uri="{BB962C8B-B14F-4D97-AF65-F5344CB8AC3E}">
-        <p14:creationId xmlns:p14="http://schemas.microsoft.com/office/powerpoint/2010/main" xmlns="" val="2636513739"/>
+        <p14:creationId xmlns:p14="http://schemas.microsoft.com/office/powerpoint/2010/main" val="2636513739"/>
       </p:ext>
     </p:extLst>
   </p:cSld>
@@ -2299,7 +2299,7 @@
     </p:spTree>
     <p:extLst>
       <p:ext uri="{BB962C8B-B14F-4D97-AF65-F5344CB8AC3E}">
-        <p14:creationId xmlns:p14="http://schemas.microsoft.com/office/powerpoint/2010/main" xmlns="" val="2947478832"/>
+        <p14:creationId xmlns:p14="http://schemas.microsoft.com/office/powerpoint/2010/main" val="2947478832"/>
       </p:ext>
     </p:extLst>
   </p:cSld>
@@ -2445,7 +2445,7 @@
     </p:spTree>
     <p:extLst>
       <p:ext uri="{BB962C8B-B14F-4D97-AF65-F5344CB8AC3E}">
-        <p14:creationId xmlns:p14="http://schemas.microsoft.com/office/powerpoint/2010/main" xmlns="" val="2947478832"/>
+        <p14:creationId xmlns:p14="http://schemas.microsoft.com/office/powerpoint/2010/main" val="2947478832"/>
       </p:ext>
     </p:extLst>
   </p:cSld>
@@ -3088,7 +3088,7 @@
             <a:fld id="{1BA50D42-C9CD-4801-B293-61D1F53EC57E}" type="datetimeFigureOut">
               <a:rPr lang="de-DE" smtClean="0"/>
               <a:pPr/>
-              <a:t>18.05.2016</a:t>
+              <a:t>18.05.16</a:t>
             </a:fld>
             <a:endParaRPr lang="de-DE"/>
           </a:p>
@@ -3255,7 +3255,7 @@
             <a:fld id="{1BA50D42-C9CD-4801-B293-61D1F53EC57E}" type="datetimeFigureOut">
               <a:rPr lang="de-DE" smtClean="0"/>
               <a:pPr/>
-              <a:t>18.05.2016</a:t>
+              <a:t>18.05.16</a:t>
             </a:fld>
             <a:endParaRPr lang="de-DE"/>
           </a:p>
@@ -3432,7 +3432,7 @@
             <a:fld id="{1BA50D42-C9CD-4801-B293-61D1F53EC57E}" type="datetimeFigureOut">
               <a:rPr lang="de-DE" smtClean="0"/>
               <a:pPr/>
-              <a:t>18.05.2016</a:t>
+              <a:t>18.05.16</a:t>
             </a:fld>
             <a:endParaRPr lang="de-DE"/>
           </a:p>
@@ -3599,7 +3599,7 @@
             <a:fld id="{1BA50D42-C9CD-4801-B293-61D1F53EC57E}" type="datetimeFigureOut">
               <a:rPr lang="de-DE" smtClean="0"/>
               <a:pPr/>
-              <a:t>18.05.2016</a:t>
+              <a:t>18.05.16</a:t>
             </a:fld>
             <a:endParaRPr lang="de-DE"/>
           </a:p>
@@ -3842,7 +3842,7 @@
             <a:fld id="{1BA50D42-C9CD-4801-B293-61D1F53EC57E}" type="datetimeFigureOut">
               <a:rPr lang="de-DE" smtClean="0"/>
               <a:pPr/>
-              <a:t>18.05.2016</a:t>
+              <a:t>18.05.16</a:t>
             </a:fld>
             <a:endParaRPr lang="de-DE"/>
           </a:p>
@@ -4127,7 +4127,7 @@
             <a:fld id="{1BA50D42-C9CD-4801-B293-61D1F53EC57E}" type="datetimeFigureOut">
               <a:rPr lang="de-DE" smtClean="0"/>
               <a:pPr/>
-              <a:t>18.05.2016</a:t>
+              <a:t>18.05.16</a:t>
             </a:fld>
             <a:endParaRPr lang="de-DE"/>
           </a:p>
@@ -4546,7 +4546,7 @@
             <a:fld id="{1BA50D42-C9CD-4801-B293-61D1F53EC57E}" type="datetimeFigureOut">
               <a:rPr lang="de-DE" smtClean="0"/>
               <a:pPr/>
-              <a:t>18.05.2016</a:t>
+              <a:t>18.05.16</a:t>
             </a:fld>
             <a:endParaRPr lang="de-DE"/>
           </a:p>
@@ -4661,7 +4661,7 @@
             <a:fld id="{1BA50D42-C9CD-4801-B293-61D1F53EC57E}" type="datetimeFigureOut">
               <a:rPr lang="de-DE" smtClean="0"/>
               <a:pPr/>
-              <a:t>18.05.2016</a:t>
+              <a:t>18.05.16</a:t>
             </a:fld>
             <a:endParaRPr lang="de-DE"/>
           </a:p>
@@ -4753,7 +4753,7 @@
             <a:fld id="{1BA50D42-C9CD-4801-B293-61D1F53EC57E}" type="datetimeFigureOut">
               <a:rPr lang="de-DE" smtClean="0"/>
               <a:pPr/>
-              <a:t>18.05.2016</a:t>
+              <a:t>18.05.16</a:t>
             </a:fld>
             <a:endParaRPr lang="de-DE"/>
           </a:p>
@@ -5027,7 +5027,7 @@
             <a:fld id="{1BA50D42-C9CD-4801-B293-61D1F53EC57E}" type="datetimeFigureOut">
               <a:rPr lang="de-DE" smtClean="0"/>
               <a:pPr/>
-              <a:t>18.05.2016</a:t>
+              <a:t>18.05.16</a:t>
             </a:fld>
             <a:endParaRPr lang="de-DE"/>
           </a:p>
@@ -5277,7 +5277,7 @@
             <a:fld id="{1BA50D42-C9CD-4801-B293-61D1F53EC57E}" type="datetimeFigureOut">
               <a:rPr lang="de-DE" smtClean="0"/>
               <a:pPr/>
-              <a:t>18.05.2016</a:t>
+              <a:t>18.05.16</a:t>
             </a:fld>
             <a:endParaRPr lang="de-DE"/>
           </a:p>
@@ -5487,7 +5487,7 @@
             <a:fld id="{1BA50D42-C9CD-4801-B293-61D1F53EC57E}" type="datetimeFigureOut">
               <a:rPr lang="de-DE" smtClean="0"/>
               <a:pPr/>
-              <a:t>18.05.2016</a:t>
+              <a:t>18.05.16</a:t>
             </a:fld>
             <a:endParaRPr lang="de-DE"/>
           </a:p>
@@ -6134,7 +6134,7 @@
   <p:timing>
     <p:tnLst>
       <p:par>
-        <p:cTn id="1" dur="indefinite" restart="never" nodeType="tmRoot"/>
+        <p:cTn xmlns:p14="http://schemas.microsoft.com/office/powerpoint/2010/main" id="1" dur="indefinite" restart="never" nodeType="tmRoot"/>
       </p:par>
     </p:tnLst>
   </p:timing>
@@ -6359,7 +6359,7 @@
   <p:timing>
     <p:tnLst>
       <p:par>
-        <p:cTn id="1" dur="indefinite" restart="never" nodeType="tmRoot"/>
+        <p:cTn xmlns:p14="http://schemas.microsoft.com/office/powerpoint/2010/main" id="1" dur="indefinite" restart="never" nodeType="tmRoot"/>
       </p:par>
     </p:tnLst>
   </p:timing>
@@ -6576,7 +6576,7 @@
   <p:timing>
     <p:tnLst>
       <p:par>
-        <p:cTn id="1" dur="indefinite" restart="never" nodeType="tmRoot"/>
+        <p:cTn xmlns:p14="http://schemas.microsoft.com/office/powerpoint/2010/main" id="1" dur="indefinite" restart="never" nodeType="tmRoot"/>
       </p:par>
     </p:tnLst>
   </p:timing>
@@ -6883,7 +6883,7 @@
   <p:timing>
     <p:tnLst>
       <p:par>
-        <p:cTn id="1" dur="indefinite" restart="never" nodeType="tmRoot"/>
+        <p:cTn xmlns:p14="http://schemas.microsoft.com/office/powerpoint/2010/main" id="1" dur="indefinite" restart="never" nodeType="tmRoot"/>
       </p:par>
     </p:tnLst>
   </p:timing>
@@ -7529,7 +7529,7 @@
     </p:spTree>
     <p:extLst>
       <p:ext uri="{BB962C8B-B14F-4D97-AF65-F5344CB8AC3E}">
-        <p14:creationId xmlns:p14="http://schemas.microsoft.com/office/powerpoint/2010/main" xmlns="" val="3075067597"/>
+        <p14:creationId xmlns:p14="http://schemas.microsoft.com/office/powerpoint/2010/main" val="3075067597"/>
       </p:ext>
     </p:extLst>
   </p:cSld>
@@ -7539,7 +7539,7 @@
   <p:timing>
     <p:tnLst>
       <p:par>
-        <p:cTn id="1" dur="indefinite" restart="never" nodeType="tmRoot"/>
+        <p:cTn xmlns:p14="http://schemas.microsoft.com/office/powerpoint/2010/main" id="1" dur="indefinite" restart="never" nodeType="tmRoot"/>
       </p:par>
     </p:tnLst>
   </p:timing>
@@ -7773,7 +7773,7 @@
     </p:spTree>
     <p:extLst>
       <p:ext uri="{BB962C8B-B14F-4D97-AF65-F5344CB8AC3E}">
-        <p14:creationId xmlns:p14="http://schemas.microsoft.com/office/powerpoint/2010/main" xmlns="" val="149987943"/>
+        <p14:creationId xmlns:p14="http://schemas.microsoft.com/office/powerpoint/2010/main" val="149987943"/>
       </p:ext>
     </p:extLst>
   </p:cSld>
@@ -7783,7 +7783,7 @@
   <p:timing>
     <p:tnLst>
       <p:par>
-        <p:cTn id="1" dur="indefinite" restart="never" nodeType="tmRoot"/>
+        <p:cTn xmlns:p14="http://schemas.microsoft.com/office/powerpoint/2010/main" id="1" dur="indefinite" restart="never" nodeType="tmRoot"/>
       </p:par>
     </p:tnLst>
   </p:timing>
@@ -8254,7 +8254,7 @@
     </p:spTree>
     <p:extLst>
       <p:ext uri="{BB962C8B-B14F-4D97-AF65-F5344CB8AC3E}">
-        <p14:creationId xmlns:p14="http://schemas.microsoft.com/office/powerpoint/2010/main" xmlns="" val="890252917"/>
+        <p14:creationId xmlns:p14="http://schemas.microsoft.com/office/powerpoint/2010/main" val="890252917"/>
       </p:ext>
     </p:extLst>
   </p:cSld>
@@ -8264,7 +8264,7 @@
   <p:timing>
     <p:tnLst>
       <p:par>
-        <p:cTn id="1" dur="indefinite" restart="never" nodeType="tmRoot"/>
+        <p:cTn xmlns:p14="http://schemas.microsoft.com/office/powerpoint/2010/main" id="1" dur="indefinite" restart="never" nodeType="tmRoot"/>
       </p:par>
     </p:tnLst>
   </p:timing>
@@ -8502,7 +8502,7 @@
     </p:spTree>
     <p:extLst>
       <p:ext uri="{BB962C8B-B14F-4D97-AF65-F5344CB8AC3E}">
-        <p14:creationId xmlns:p14="http://schemas.microsoft.com/office/powerpoint/2010/main" xmlns="" val="3919436087"/>
+        <p14:creationId xmlns:p14="http://schemas.microsoft.com/office/powerpoint/2010/main" val="3919436087"/>
       </p:ext>
     </p:extLst>
   </p:cSld>
@@ -8512,7 +8512,7 @@
   <p:timing>
     <p:tnLst>
       <p:par>
-        <p:cTn id="1" dur="indefinite" restart="never" nodeType="tmRoot"/>
+        <p:cTn xmlns:p14="http://schemas.microsoft.com/office/powerpoint/2010/main" id="1" dur="indefinite" restart="never" nodeType="tmRoot"/>
       </p:par>
     </p:tnLst>
   </p:timing>
@@ -9123,7 +9123,7 @@
     </p:spTree>
     <p:extLst>
       <p:ext uri="{BB962C8B-B14F-4D97-AF65-F5344CB8AC3E}">
-        <p14:creationId xmlns:p14="http://schemas.microsoft.com/office/powerpoint/2010/main" xmlns="" val="401687663"/>
+        <p14:creationId xmlns:p14="http://schemas.microsoft.com/office/powerpoint/2010/main" val="401687663"/>
       </p:ext>
     </p:extLst>
   </p:cSld>
@@ -9133,7 +9133,7 @@
   <p:timing>
     <p:tnLst>
       <p:par>
-        <p:cTn id="1" dur="indefinite" restart="never" nodeType="tmRoot"/>
+        <p:cTn xmlns:p14="http://schemas.microsoft.com/office/powerpoint/2010/main" id="1" dur="indefinite" restart="never" nodeType="tmRoot"/>
       </p:par>
     </p:tnLst>
   </p:timing>
@@ -9363,7 +9363,7 @@
     </p:spTree>
     <p:extLst>
       <p:ext uri="{BB962C8B-B14F-4D97-AF65-F5344CB8AC3E}">
-        <p14:creationId xmlns:p14="http://schemas.microsoft.com/office/powerpoint/2010/main" xmlns="" val="3729958523"/>
+        <p14:creationId xmlns:p14="http://schemas.microsoft.com/office/powerpoint/2010/main" val="3729958523"/>
       </p:ext>
     </p:extLst>
   </p:cSld>
@@ -9373,7 +9373,7 @@
   <p:timing>
     <p:tnLst>
       <p:par>
-        <p:cTn id="1" dur="indefinite" restart="never" nodeType="tmRoot"/>
+        <p:cTn xmlns:p14="http://schemas.microsoft.com/office/powerpoint/2010/main" id="1" dur="indefinite" restart="never" nodeType="tmRoot"/>
       </p:par>
     </p:tnLst>
   </p:timing>
@@ -10130,7 +10130,7 @@
     </p:spTree>
     <p:extLst>
       <p:ext uri="{BB962C8B-B14F-4D97-AF65-F5344CB8AC3E}">
-        <p14:creationId xmlns:p14="http://schemas.microsoft.com/office/powerpoint/2010/main" xmlns="" val="1162914699"/>
+        <p14:creationId xmlns:p14="http://schemas.microsoft.com/office/powerpoint/2010/main" val="1162914699"/>
       </p:ext>
     </p:extLst>
   </p:cSld>
@@ -10140,7 +10140,7 @@
   <p:timing>
     <p:tnLst>
       <p:par>
-        <p:cTn id="1" dur="indefinite" restart="never" nodeType="tmRoot"/>
+        <p:cTn xmlns:p14="http://schemas.microsoft.com/office/powerpoint/2010/main" id="1" dur="indefinite" restart="never" nodeType="tmRoot"/>
       </p:par>
     </p:tnLst>
   </p:timing>
@@ -10357,7 +10357,7 @@
   <p:timing>
     <p:tnLst>
       <p:par>
-        <p:cTn id="1" dur="indefinite" restart="never" nodeType="tmRoot"/>
+        <p:cTn xmlns:p14="http://schemas.microsoft.com/office/powerpoint/2010/main" id="1" dur="indefinite" restart="never" nodeType="tmRoot"/>
       </p:par>
     </p:tnLst>
   </p:timing>
@@ -10583,7 +10583,7 @@
     </p:spTree>
     <p:extLst>
       <p:ext uri="{BB962C8B-B14F-4D97-AF65-F5344CB8AC3E}">
-        <p14:creationId xmlns:p14="http://schemas.microsoft.com/office/powerpoint/2010/main" xmlns="" val="1569405094"/>
+        <p14:creationId xmlns:p14="http://schemas.microsoft.com/office/powerpoint/2010/main" val="1569405094"/>
       </p:ext>
     </p:extLst>
   </p:cSld>
@@ -10593,7 +10593,7 @@
   <p:timing>
     <p:tnLst>
       <p:par>
-        <p:cTn id="1" dur="indefinite" restart="never" nodeType="tmRoot"/>
+        <p:cTn xmlns:p14="http://schemas.microsoft.com/office/powerpoint/2010/main" id="1" dur="indefinite" restart="never" nodeType="tmRoot"/>
       </p:par>
     </p:tnLst>
   </p:timing>
@@ -11103,7 +11103,7 @@
     </p:spTree>
     <p:extLst>
       <p:ext uri="{BB962C8B-B14F-4D97-AF65-F5344CB8AC3E}">
-        <p14:creationId xmlns:p14="http://schemas.microsoft.com/office/powerpoint/2010/main" xmlns="" val="2016165428"/>
+        <p14:creationId xmlns:p14="http://schemas.microsoft.com/office/powerpoint/2010/main" val="2016165428"/>
       </p:ext>
     </p:extLst>
   </p:cSld>
@@ -11113,7 +11113,7 @@
   <p:timing>
     <p:tnLst>
       <p:par>
-        <p:cTn id="1" dur="indefinite" restart="never" nodeType="tmRoot"/>
+        <p:cTn xmlns:p14="http://schemas.microsoft.com/office/powerpoint/2010/main" id="1" dur="indefinite" restart="never" nodeType="tmRoot"/>
       </p:par>
     </p:tnLst>
   </p:timing>
@@ -11404,7 +11404,7 @@
     </p:spTree>
     <p:extLst>
       <p:ext uri="{BB962C8B-B14F-4D97-AF65-F5344CB8AC3E}">
-        <p14:creationId xmlns:p14="http://schemas.microsoft.com/office/powerpoint/2010/main" xmlns="" val="341076260"/>
+        <p14:creationId xmlns:p14="http://schemas.microsoft.com/office/powerpoint/2010/main" val="341076260"/>
       </p:ext>
     </p:extLst>
   </p:cSld>
@@ -11414,7 +11414,7 @@
   <p:timing>
     <p:tnLst>
       <p:par>
-        <p:cTn id="1" dur="indefinite" restart="never" nodeType="tmRoot">
+        <p:cTn xmlns:p14="http://schemas.microsoft.com/office/powerpoint/2010/main" id="1" dur="indefinite" restart="never" nodeType="tmRoot">
           <p:childTnLst>
             <p:seq concurrent="1" nextAc="seek">
               <p:cTn id="2" dur="indefinite" nodeType="mainSeq">
@@ -11810,14 +11810,14 @@
               <a:t>(</a:t>
             </a:r>
             <a:r>
-              <a:rPr lang="de-DE" sz="1600" dirty="0" err="1">
+              <a:rPr lang="de-DE" sz="1600" dirty="0" err="1" smtClean="0">
                 <a:latin typeface="Source Code Pro"/>
                 <a:cs typeface="Source Code Pro"/>
               </a:rPr>
               <a:t>KlassB.</a:t>
             </a:r>
             <a:r>
-              <a:rPr lang="de-DE" sz="1600" b="1" dirty="0" err="1">
+              <a:rPr lang="de-DE" sz="1600" b="1" dirty="0" err="1" smtClean="0">
                 <a:solidFill>
                   <a:srgbClr val="660066"/>
                 </a:solidFill>
@@ -12263,8 +12263,8 @@
         </p:blipFill>
         <p:spPr bwMode="auto">
           <a:xfrm>
-            <a:off x="5110157" y="1923678"/>
-            <a:ext cx="4033844" cy="3075806"/>
+            <a:off x="5865650" y="2499742"/>
+            <a:ext cx="3278350" cy="2499742"/>
           </a:xfrm>
           <a:prstGeom prst="rect">
             <a:avLst/>
@@ -12275,7 +12275,7 @@
     </p:spTree>
     <p:extLst>
       <p:ext uri="{BB962C8B-B14F-4D97-AF65-F5344CB8AC3E}">
-        <p14:creationId xmlns:p14="http://schemas.microsoft.com/office/powerpoint/2010/main" xmlns="" val="3433374058"/>
+        <p14:creationId xmlns:p14="http://schemas.microsoft.com/office/powerpoint/2010/main" val="3433374058"/>
       </p:ext>
     </p:extLst>
   </p:cSld>
@@ -12285,7 +12285,7 @@
   <p:timing>
     <p:tnLst>
       <p:par>
-        <p:cTn id="1" dur="indefinite" restart="never" nodeType="tmRoot"/>
+        <p:cTn xmlns:p14="http://schemas.microsoft.com/office/powerpoint/2010/main" id="1" dur="indefinite" restart="never" nodeType="tmRoot"/>
       </p:par>
     </p:tnLst>
   </p:timing>
@@ -13736,7 +13736,7 @@
   <p:timing>
     <p:tnLst>
       <p:par>
-        <p:cTn id="1" dur="indefinite" restart="never" nodeType="tmRoot">
+        <p:cTn xmlns:p14="http://schemas.microsoft.com/office/powerpoint/2010/main" id="1" dur="indefinite" restart="never" nodeType="tmRoot">
           <p:childTnLst>
             <p:seq concurrent="1" nextAc="seek">
               <p:cTn id="2" dur="indefinite" nodeType="mainSeq">
@@ -16382,7 +16382,7 @@
   <p:timing>
     <p:tnLst>
       <p:par>
-        <p:cTn id="1" dur="indefinite" restart="never" nodeType="tmRoot">
+        <p:cTn xmlns:p14="http://schemas.microsoft.com/office/powerpoint/2010/main" id="1" dur="indefinite" restart="never" nodeType="tmRoot">
           <p:childTnLst>
             <p:seq concurrent="1" nextAc="seek">
               <p:cTn id="2" dur="indefinite" nodeType="mainSeq">
@@ -19145,7 +19145,7 @@
   <p:timing>
     <p:tnLst>
       <p:par>
-        <p:cTn id="1" dur="indefinite" restart="never" nodeType="tmRoot"/>
+        <p:cTn xmlns:p14="http://schemas.microsoft.com/office/powerpoint/2010/main" id="1" dur="indefinite" restart="never" nodeType="tmRoot"/>
       </p:par>
     </p:tnLst>
   </p:timing>
@@ -21688,7 +21688,7 @@
   <p:timing>
     <p:tnLst>
       <p:par>
-        <p:cTn id="1" dur="indefinite" restart="never" nodeType="tmRoot">
+        <p:cTn xmlns:p14="http://schemas.microsoft.com/office/powerpoint/2010/main" id="1" dur="indefinite" restart="never" nodeType="tmRoot">
           <p:childTnLst>
             <p:seq concurrent="1" nextAc="seek">
               <p:cTn id="2" dur="indefinite" nodeType="mainSeq">
@@ -22204,7 +22204,7 @@
   <p:timing>
     <p:tnLst>
       <p:par>
-        <p:cTn id="1" dur="indefinite" restart="never" nodeType="tmRoot">
+        <p:cTn xmlns:p14="http://schemas.microsoft.com/office/powerpoint/2010/main" id="1" dur="indefinite" restart="never" nodeType="tmRoot">
           <p:childTnLst>
             <p:seq concurrent="1" nextAc="seek">
               <p:cTn id="2" dur="indefinite" nodeType="mainSeq">
@@ -22660,7 +22660,7 @@
   <p:timing>
     <p:tnLst>
       <p:par>
-        <p:cTn id="1" dur="indefinite" restart="never" nodeType="tmRoot"/>
+        <p:cTn xmlns:p14="http://schemas.microsoft.com/office/powerpoint/2010/main" id="1" dur="indefinite" restart="never" nodeType="tmRoot"/>
       </p:par>
     </p:tnLst>
   </p:timing>
@@ -22909,7 +22909,7 @@
     </p:spTree>
     <p:extLst>
       <p:ext uri="{BB962C8B-B14F-4D97-AF65-F5344CB8AC3E}">
-        <p14:creationId xmlns:p14="http://schemas.microsoft.com/office/powerpoint/2010/main" xmlns="" val="2268789953"/>
+        <p14:creationId xmlns:p14="http://schemas.microsoft.com/office/powerpoint/2010/main" val="2268789953"/>
       </p:ext>
     </p:extLst>
   </p:cSld>
@@ -22919,7 +22919,7 @@
   <p:timing>
     <p:tnLst>
       <p:par>
-        <p:cTn id="1" dur="indefinite" restart="never" nodeType="tmRoot"/>
+        <p:cTn xmlns:p14="http://schemas.microsoft.com/office/powerpoint/2010/main" id="1" dur="indefinite" restart="never" nodeType="tmRoot"/>
       </p:par>
     </p:tnLst>
   </p:timing>
@@ -23136,7 +23136,7 @@
   <p:timing>
     <p:tnLst>
       <p:par>
-        <p:cTn id="1" dur="indefinite" restart="never" nodeType="tmRoot"/>
+        <p:cTn xmlns:p14="http://schemas.microsoft.com/office/powerpoint/2010/main" id="1" dur="indefinite" restart="never" nodeType="tmRoot"/>
       </p:par>
     </p:tnLst>
   </p:timing>
@@ -25090,7 +25090,7 @@
   <p:timing>
     <p:tnLst>
       <p:par>
-        <p:cTn id="1" dur="indefinite" restart="never" nodeType="tmRoot">
+        <p:cTn xmlns:p14="http://schemas.microsoft.com/office/powerpoint/2010/main" id="1" dur="indefinite" restart="never" nodeType="tmRoot">
           <p:childTnLst>
             <p:seq concurrent="1" nextAc="seek">
               <p:cTn id="2" dur="indefinite" nodeType="mainSeq">
@@ -26280,7 +26280,7 @@
   <p:timing>
     <p:tnLst>
       <p:par>
-        <p:cTn id="1" dur="indefinite" restart="never" nodeType="tmRoot"/>
+        <p:cTn xmlns:p14="http://schemas.microsoft.com/office/powerpoint/2010/main" id="1" dur="indefinite" restart="never" nodeType="tmRoot"/>
       </p:par>
     </p:tnLst>
   </p:timing>
@@ -27436,7 +27436,7 @@
   <p:timing>
     <p:tnLst>
       <p:par>
-        <p:cTn id="1" dur="indefinite" restart="never" nodeType="tmRoot">
+        <p:cTn xmlns:p14="http://schemas.microsoft.com/office/powerpoint/2010/main" id="1" dur="indefinite" restart="never" nodeType="tmRoot">
           <p:childTnLst>
             <p:seq concurrent="1" nextAc="seek">
               <p:cTn id="2" dur="indefinite" nodeType="mainSeq">
@@ -28773,7 +28773,7 @@
   <p:timing>
     <p:tnLst>
       <p:par>
-        <p:cTn id="1" dur="indefinite" restart="never" nodeType="tmRoot"/>
+        <p:cTn xmlns:p14="http://schemas.microsoft.com/office/powerpoint/2010/main" id="1" dur="indefinite" restart="never" nodeType="tmRoot"/>
       </p:par>
     </p:tnLst>
   </p:timing>
@@ -28870,7 +28870,7 @@
   <p:timing>
     <p:tnLst>
       <p:par>
-        <p:cTn id="1" dur="indefinite" restart="never" nodeType="tmRoot"/>
+        <p:cTn xmlns:p14="http://schemas.microsoft.com/office/powerpoint/2010/main" id="1" dur="indefinite" restart="never" nodeType="tmRoot"/>
       </p:par>
     </p:tnLst>
   </p:timing>
@@ -30508,7 +30508,7 @@
   <p:timing>
     <p:tnLst>
       <p:par>
-        <p:cTn id="1" dur="indefinite" restart="never" nodeType="tmRoot"/>
+        <p:cTn xmlns:p14="http://schemas.microsoft.com/office/powerpoint/2010/main" id="1" dur="indefinite" restart="never" nodeType="tmRoot"/>
       </p:par>
     </p:tnLst>
   </p:timing>
@@ -32564,7 +32564,7 @@
   <p:timing>
     <p:tnLst>
       <p:par>
-        <p:cTn id="1" dur="indefinite" restart="never" nodeType="tmRoot"/>
+        <p:cTn xmlns:p14="http://schemas.microsoft.com/office/powerpoint/2010/main" id="1" dur="indefinite" restart="never" nodeType="tmRoot"/>
       </p:par>
     </p:tnLst>
   </p:timing>
@@ -32661,7 +32661,7 @@
   <p:timing>
     <p:tnLst>
       <p:par>
-        <p:cTn id="1" dur="indefinite" restart="never" nodeType="tmRoot"/>
+        <p:cTn xmlns:p14="http://schemas.microsoft.com/office/powerpoint/2010/main" id="1" dur="indefinite" restart="never" nodeType="tmRoot"/>
       </p:par>
     </p:tnLst>
   </p:timing>
@@ -33107,7 +33107,7 @@
   <p:timing>
     <p:tnLst>
       <p:par>
-        <p:cTn id="1" dur="indefinite" restart="never" nodeType="tmRoot"/>
+        <p:cTn xmlns:p14="http://schemas.microsoft.com/office/powerpoint/2010/main" id="1" dur="indefinite" restart="never" nodeType="tmRoot"/>
       </p:par>
     </p:tnLst>
   </p:timing>
@@ -33468,7 +33468,7 @@
     </p:spTree>
     <p:extLst>
       <p:ext uri="{BB962C8B-B14F-4D97-AF65-F5344CB8AC3E}">
-        <p14:creationId xmlns:p14="http://schemas.microsoft.com/office/powerpoint/2010/main" xmlns="" val="2260232245"/>
+        <p14:creationId xmlns:p14="http://schemas.microsoft.com/office/powerpoint/2010/main" val="2260232245"/>
       </p:ext>
     </p:extLst>
   </p:cSld>
@@ -33478,7 +33478,7 @@
   <p:timing>
     <p:tnLst>
       <p:par>
-        <p:cTn id="1" dur="indefinite" restart="never" nodeType="tmRoot"/>
+        <p:cTn xmlns:p14="http://schemas.microsoft.com/office/powerpoint/2010/main" id="1" dur="indefinite" restart="never" nodeType="tmRoot"/>
       </p:par>
     </p:tnLst>
   </p:timing>
@@ -33574,7 +33574,7 @@
   <p:timing>
     <p:tnLst>
       <p:par>
-        <p:cTn id="1" dur="indefinite" restart="never" nodeType="tmRoot"/>
+        <p:cTn xmlns:p14="http://schemas.microsoft.com/office/powerpoint/2010/main" id="1" dur="indefinite" restart="never" nodeType="tmRoot"/>
       </p:par>
     </p:tnLst>
   </p:timing>
@@ -33790,7 +33790,7 @@
   <p:timing>
     <p:tnLst>
       <p:par>
-        <p:cTn id="1" dur="indefinite" restart="never" nodeType="tmRoot"/>
+        <p:cTn xmlns:p14="http://schemas.microsoft.com/office/powerpoint/2010/main" id="1" dur="indefinite" restart="never" nodeType="tmRoot"/>
       </p:par>
     </p:tnLst>
   </p:timing>
@@ -34017,7 +34017,7 @@
   <p:timing>
     <p:tnLst>
       <p:par>
-        <p:cTn id="1" dur="indefinite" restart="never" nodeType="tmRoot"/>
+        <p:cTn xmlns:p14="http://schemas.microsoft.com/office/powerpoint/2010/main" id="1" dur="indefinite" restart="never" nodeType="tmRoot"/>
       </p:par>
     </p:tnLst>
   </p:timing>
@@ -34412,7 +34412,7 @@
   <p:timing>
     <p:tnLst>
       <p:par>
-        <p:cTn id="1" dur="indefinite" restart="never" nodeType="tmRoot"/>
+        <p:cTn xmlns:p14="http://schemas.microsoft.com/office/powerpoint/2010/main" id="1" dur="indefinite" restart="never" nodeType="tmRoot"/>
       </p:par>
     </p:tnLst>
   </p:timing>
@@ -34729,7 +34729,7 @@
   <p:timing>
     <p:tnLst>
       <p:par>
-        <p:cTn id="1" dur="indefinite" restart="never" nodeType="tmRoot"/>
+        <p:cTn xmlns:p14="http://schemas.microsoft.com/office/powerpoint/2010/main" id="1" dur="indefinite" restart="never" nodeType="tmRoot"/>
       </p:par>
     </p:tnLst>
   </p:timing>
@@ -35011,7 +35011,7 @@
   <p:timing>
     <p:tnLst>
       <p:par>
-        <p:cTn id="1" dur="indefinite" restart="never" nodeType="tmRoot"/>
+        <p:cTn xmlns:p14="http://schemas.microsoft.com/office/powerpoint/2010/main" id="1" dur="indefinite" restart="never" nodeType="tmRoot"/>
       </p:par>
     </p:tnLst>
   </p:timing>
@@ -35183,7 +35183,7 @@
   <p:timing>
     <p:tnLst>
       <p:par>
-        <p:cTn id="1" dur="indefinite" restart="never" nodeType="tmRoot"/>
+        <p:cTn xmlns:p14="http://schemas.microsoft.com/office/powerpoint/2010/main" id="1" dur="indefinite" restart="never" nodeType="tmRoot"/>
       </p:par>
     </p:tnLst>
   </p:timing>
@@ -35279,7 +35279,7 @@
   <p:timing>
     <p:tnLst>
       <p:par>
-        <p:cTn id="1" dur="indefinite" restart="never" nodeType="tmRoot"/>
+        <p:cTn xmlns:p14="http://schemas.microsoft.com/office/powerpoint/2010/main" id="1" dur="indefinite" restart="never" nodeType="tmRoot"/>
       </p:par>
     </p:tnLst>
   </p:timing>
@@ -35513,7 +35513,7 @@
   <p:timing>
     <p:tnLst>
       <p:par>
-        <p:cTn id="1" dur="indefinite" restart="never" nodeType="tmRoot"/>
+        <p:cTn xmlns:p14="http://schemas.microsoft.com/office/powerpoint/2010/main" id="1" dur="indefinite" restart="never" nodeType="tmRoot"/>
       </p:par>
     </p:tnLst>
   </p:timing>
@@ -35621,7 +35621,7 @@
     </p:spTree>
     <p:extLst>
       <p:ext uri="{BB962C8B-B14F-4D97-AF65-F5344CB8AC3E}">
-        <p14:creationId xmlns:p14="http://schemas.microsoft.com/office/powerpoint/2010/main" xmlns="" val="732667562"/>
+        <p14:creationId xmlns:p14="http://schemas.microsoft.com/office/powerpoint/2010/main" val="732667562"/>
       </p:ext>
     </p:extLst>
   </p:cSld>
@@ -35631,7 +35631,7 @@
   <p:timing>
     <p:tnLst>
       <p:par>
-        <p:cTn id="1" dur="indefinite" restart="never" nodeType="tmRoot"/>
+        <p:cTn xmlns:p14="http://schemas.microsoft.com/office/powerpoint/2010/main" id="1" dur="indefinite" restart="never" nodeType="tmRoot"/>
       </p:par>
     </p:tnLst>
   </p:timing>
@@ -36041,7 +36041,7 @@
     </p:spTree>
     <p:extLst>
       <p:ext uri="{BB962C8B-B14F-4D97-AF65-F5344CB8AC3E}">
-        <p14:creationId xmlns:p14="http://schemas.microsoft.com/office/powerpoint/2010/main" xmlns="" val="391067495"/>
+        <p14:creationId xmlns:p14="http://schemas.microsoft.com/office/powerpoint/2010/main" val="391067495"/>
       </p:ext>
     </p:extLst>
   </p:cSld>
@@ -36051,7 +36051,7 @@
   <p:timing>
     <p:tnLst>
       <p:par>
-        <p:cTn id="1" dur="indefinite" restart="never" nodeType="tmRoot">
+        <p:cTn xmlns:p14="http://schemas.microsoft.com/office/powerpoint/2010/main" id="1" dur="indefinite" restart="never" nodeType="tmRoot">
           <p:childTnLst>
             <p:seq concurrent="1" nextAc="seek">
               <p:cTn id="2" dur="indefinite" nodeType="mainSeq">
@@ -36691,7 +36691,7 @@
     </p:spTree>
     <p:extLst>
       <p:ext uri="{BB962C8B-B14F-4D97-AF65-F5344CB8AC3E}">
-        <p14:creationId xmlns:p14="http://schemas.microsoft.com/office/powerpoint/2010/main" xmlns="" val="2042807844"/>
+        <p14:creationId xmlns:p14="http://schemas.microsoft.com/office/powerpoint/2010/main" val="2042807844"/>
       </p:ext>
     </p:extLst>
   </p:cSld>
@@ -36701,7 +36701,7 @@
   <p:timing>
     <p:tnLst>
       <p:par>
-        <p:cTn id="1" dur="indefinite" restart="never" nodeType="tmRoot"/>
+        <p:cTn xmlns:p14="http://schemas.microsoft.com/office/powerpoint/2010/main" id="1" dur="indefinite" restart="never" nodeType="tmRoot"/>
       </p:par>
     </p:tnLst>
   </p:timing>
@@ -36863,7 +36863,7 @@
   <p:timing>
     <p:tnLst>
       <p:par>
-        <p:cTn id="1" dur="indefinite" restart="never" nodeType="tmRoot"/>
+        <p:cTn xmlns:p14="http://schemas.microsoft.com/office/powerpoint/2010/main" id="1" dur="indefinite" restart="never" nodeType="tmRoot"/>
       </p:par>
     </p:tnLst>
   </p:timing>

</xml_diff>